<commit_message>
mert nyomni, nyomni kell
</commit_message>
<xml_diff>
--- a/ppts/diagrams.pptx
+++ b/ppts/diagrams.pptx
@@ -11,6 +11,7 @@
     <p:sldId id="259" r:id="rId5"/>
     <p:sldId id="260" r:id="rId6"/>
     <p:sldId id="262" r:id="rId7"/>
+    <p:sldId id="263" r:id="rId8"/>
   </p:sldIdLst>
   <p:sldSz cx="12192000" cy="6858000"/>
   <p:notesSz cx="6858000" cy="9144000"/>
@@ -109,6 +110,11 @@
       </a:defRPr>
     </a:lvl9pPr>
   </p:defaultTextStyle>
+  <p:extLst>
+    <p:ext uri="{EFAFB233-063F-42B5-8137-9DF3F51BA10A}">
+      <p15:sldGuideLst xmlns:p15="http://schemas.microsoft.com/office/powerpoint/2012/main"/>
+    </p:ext>
+  </p:extLst>
 </p:presentation>
 </file>
 
@@ -261,7 +267,7 @@
           <a:p>
             <a:fld id="{6E246BA4-EDD2-4842-89DC-A5984E6A9B8D}" type="datetimeFigureOut">
               <a:rPr lang="en-GB" smtClean="0"/>
-              <a:t>20/10/2021</a:t>
+              <a:t>24/10/2021</a:t>
             </a:fld>
             <a:endParaRPr lang="en-GB"/>
           </a:p>
@@ -461,7 +467,7 @@
           <a:p>
             <a:fld id="{6E246BA4-EDD2-4842-89DC-A5984E6A9B8D}" type="datetimeFigureOut">
               <a:rPr lang="en-GB" smtClean="0"/>
-              <a:t>20/10/2021</a:t>
+              <a:t>24/10/2021</a:t>
             </a:fld>
             <a:endParaRPr lang="en-GB"/>
           </a:p>
@@ -671,7 +677,7 @@
           <a:p>
             <a:fld id="{6E246BA4-EDD2-4842-89DC-A5984E6A9B8D}" type="datetimeFigureOut">
               <a:rPr lang="en-GB" smtClean="0"/>
-              <a:t>20/10/2021</a:t>
+              <a:t>24/10/2021</a:t>
             </a:fld>
             <a:endParaRPr lang="en-GB"/>
           </a:p>
@@ -871,7 +877,7 @@
           <a:p>
             <a:fld id="{6E246BA4-EDD2-4842-89DC-A5984E6A9B8D}" type="datetimeFigureOut">
               <a:rPr lang="en-GB" smtClean="0"/>
-              <a:t>20/10/2021</a:t>
+              <a:t>24/10/2021</a:t>
             </a:fld>
             <a:endParaRPr lang="en-GB"/>
           </a:p>
@@ -1147,7 +1153,7 @@
           <a:p>
             <a:fld id="{6E246BA4-EDD2-4842-89DC-A5984E6A9B8D}" type="datetimeFigureOut">
               <a:rPr lang="en-GB" smtClean="0"/>
-              <a:t>20/10/2021</a:t>
+              <a:t>24/10/2021</a:t>
             </a:fld>
             <a:endParaRPr lang="en-GB"/>
           </a:p>
@@ -1415,7 +1421,7 @@
           <a:p>
             <a:fld id="{6E246BA4-EDD2-4842-89DC-A5984E6A9B8D}" type="datetimeFigureOut">
               <a:rPr lang="en-GB" smtClean="0"/>
-              <a:t>20/10/2021</a:t>
+              <a:t>24/10/2021</a:t>
             </a:fld>
             <a:endParaRPr lang="en-GB"/>
           </a:p>
@@ -1830,7 +1836,7 @@
           <a:p>
             <a:fld id="{6E246BA4-EDD2-4842-89DC-A5984E6A9B8D}" type="datetimeFigureOut">
               <a:rPr lang="en-GB" smtClean="0"/>
-              <a:t>20/10/2021</a:t>
+              <a:t>24/10/2021</a:t>
             </a:fld>
             <a:endParaRPr lang="en-GB"/>
           </a:p>
@@ -1972,7 +1978,7 @@
           <a:p>
             <a:fld id="{6E246BA4-EDD2-4842-89DC-A5984E6A9B8D}" type="datetimeFigureOut">
               <a:rPr lang="en-GB" smtClean="0"/>
-              <a:t>20/10/2021</a:t>
+              <a:t>24/10/2021</a:t>
             </a:fld>
             <a:endParaRPr lang="en-GB"/>
           </a:p>
@@ -2085,7 +2091,7 @@
           <a:p>
             <a:fld id="{6E246BA4-EDD2-4842-89DC-A5984E6A9B8D}" type="datetimeFigureOut">
               <a:rPr lang="en-GB" smtClean="0"/>
-              <a:t>20/10/2021</a:t>
+              <a:t>24/10/2021</a:t>
             </a:fld>
             <a:endParaRPr lang="en-GB"/>
           </a:p>
@@ -2398,7 +2404,7 @@
           <a:p>
             <a:fld id="{6E246BA4-EDD2-4842-89DC-A5984E6A9B8D}" type="datetimeFigureOut">
               <a:rPr lang="en-GB" smtClean="0"/>
-              <a:t>20/10/2021</a:t>
+              <a:t>24/10/2021</a:t>
             </a:fld>
             <a:endParaRPr lang="en-GB"/>
           </a:p>
@@ -2687,7 +2693,7 @@
           <a:p>
             <a:fld id="{6E246BA4-EDD2-4842-89DC-A5984E6A9B8D}" type="datetimeFigureOut">
               <a:rPr lang="en-GB" smtClean="0"/>
-              <a:t>20/10/2021</a:t>
+              <a:t>24/10/2021</a:t>
             </a:fld>
             <a:endParaRPr lang="en-GB"/>
           </a:p>
@@ -2930,7 +2936,7 @@
           <a:p>
             <a:fld id="{6E246BA4-EDD2-4842-89DC-A5984E6A9B8D}" type="datetimeFigureOut">
               <a:rPr lang="en-GB" smtClean="0"/>
-              <a:t>20/10/2021</a:t>
+              <a:t>24/10/2021</a:t>
             </a:fld>
             <a:endParaRPr lang="en-GB"/>
           </a:p>
@@ -8719,8 +8725,8 @@
           </a:fontRef>
         </p:style>
       </p:cxnSp>
-      <mc:AlternateContent xmlns:mc="http://schemas.openxmlformats.org/markup-compatibility/2006">
-        <mc:Choice xmlns:a14="http://schemas.microsoft.com/office/drawing/2010/main" Requires="a14">
+      <mc:AlternateContent xmlns:mc="http://schemas.openxmlformats.org/markup-compatibility/2006" xmlns:a14="http://schemas.microsoft.com/office/drawing/2010/main">
+        <mc:Choice Requires="a14">
           <p:sp>
             <p:nvSpPr>
               <p:cNvPr id="27" name="Szövegdoboz 26">
@@ -8749,6 +8755,7 @@
               </a:bodyPr>
               <a:lstStyle/>
               <a:p>
+                <a:pPr/>
                 <a14:m>
                   <m:oMathPara xmlns:m="http://schemas.openxmlformats.org/officeDocument/2006/math">
                     <m:oMathParaPr>
@@ -8781,7 +8788,7 @@
             </p:txBody>
           </p:sp>
         </mc:Choice>
-        <mc:Fallback>
+        <mc:Fallback xmlns="">
           <p:sp>
             <p:nvSpPr>
               <p:cNvPr id="27" name="Szövegdoboz 26">
@@ -8826,8 +8833,8 @@
           </p:sp>
         </mc:Fallback>
       </mc:AlternateContent>
-      <mc:AlternateContent xmlns:mc="http://schemas.openxmlformats.org/markup-compatibility/2006">
-        <mc:Choice xmlns:a14="http://schemas.microsoft.com/office/drawing/2010/main" Requires="a14">
+      <mc:AlternateContent xmlns:mc="http://schemas.openxmlformats.org/markup-compatibility/2006" xmlns:a14="http://schemas.microsoft.com/office/drawing/2010/main">
+        <mc:Choice Requires="a14">
           <p:sp>
             <p:nvSpPr>
               <p:cNvPr id="28" name="Szövegdoboz 27">
@@ -8856,6 +8863,7 @@
               </a:bodyPr>
               <a:lstStyle/>
               <a:p>
+                <a:pPr/>
                 <a14:m>
                   <m:oMathPara xmlns:m="http://schemas.openxmlformats.org/officeDocument/2006/math">
                     <m:oMathParaPr>
@@ -8888,7 +8896,7 @@
             </p:txBody>
           </p:sp>
         </mc:Choice>
-        <mc:Fallback>
+        <mc:Fallback xmlns="">
           <p:sp>
             <p:nvSpPr>
               <p:cNvPr id="28" name="Szövegdoboz 27">
@@ -15272,6 +15280,748 @@
     <p:extLst>
       <p:ext uri="{BB962C8B-B14F-4D97-AF65-F5344CB8AC3E}">
         <p14:creationId xmlns:p14="http://schemas.microsoft.com/office/powerpoint/2010/main" val="2547372398"/>
+      </p:ext>
+    </p:extLst>
+  </p:cSld>
+  <p:clrMapOvr>
+    <a:masterClrMapping/>
+  </p:clrMapOvr>
+</p:sld>
+</file>
+
+<file path=ppt/slides/slide7.xml><?xml version="1.0" encoding="utf-8"?>
+<p:sld xmlns:a="http://schemas.openxmlformats.org/drawingml/2006/main" xmlns:r="http://schemas.openxmlformats.org/officeDocument/2006/relationships" xmlns:p="http://schemas.openxmlformats.org/presentationml/2006/main">
+  <p:cSld>
+    <p:spTree>
+      <p:nvGrpSpPr>
+        <p:cNvPr id="1" name=""/>
+        <p:cNvGrpSpPr/>
+        <p:nvPr/>
+      </p:nvGrpSpPr>
+      <p:grpSpPr>
+        <a:xfrm>
+          <a:off x="0" y="0"/>
+          <a:ext cx="0" cy="0"/>
+          <a:chOff x="0" y="0"/>
+          <a:chExt cx="0" cy="0"/>
+        </a:xfrm>
+      </p:grpSpPr>
+      <p:sp>
+        <p:nvSpPr>
+          <p:cNvPr id="4" name="Téglalap: lekerekített 3">
+            <a:extLst>
+              <a:ext uri="{FF2B5EF4-FFF2-40B4-BE49-F238E27FC236}">
+                <a16:creationId xmlns:a16="http://schemas.microsoft.com/office/drawing/2014/main" id="{33030EE5-F708-43D2-A984-6F6942D5D04D}"/>
+              </a:ext>
+            </a:extLst>
+          </p:cNvPr>
+          <p:cNvSpPr/>
+          <p:nvPr/>
+        </p:nvSpPr>
+        <p:spPr>
+          <a:xfrm>
+            <a:off x="1718602" y="1538951"/>
+            <a:ext cx="1404395" cy="765426"/>
+          </a:xfrm>
+          <a:prstGeom prst="roundRect">
+            <a:avLst/>
+          </a:prstGeom>
+          <a:solidFill>
+            <a:schemeClr val="bg1"/>
+          </a:solidFill>
+          <a:ln w="28575">
+            <a:solidFill>
+              <a:schemeClr val="tx1"/>
+            </a:solidFill>
+          </a:ln>
+          <a:effectLst/>
+        </p:spPr>
+        <p:style>
+          <a:lnRef idx="2">
+            <a:schemeClr val="accent4">
+              <a:shade val="50000"/>
+            </a:schemeClr>
+          </a:lnRef>
+          <a:fillRef idx="1">
+            <a:schemeClr val="accent4"/>
+          </a:fillRef>
+          <a:effectRef idx="0">
+            <a:schemeClr val="accent4"/>
+          </a:effectRef>
+          <a:fontRef idx="minor">
+            <a:schemeClr val="lt1"/>
+          </a:fontRef>
+        </p:style>
+        <p:txBody>
+          <a:bodyPr rot="0" spcFirstLastPara="0" vertOverflow="overflow" horzOverflow="overflow" vert="horz" wrap="square" lIns="91440" tIns="45720" rIns="91440" bIns="45720" numCol="1" spcCol="0" rtlCol="0" fromWordArt="0" anchor="ctr" anchorCtr="0" forceAA="0" compatLnSpc="1">
+            <a:prstTxWarp prst="textNoShape">
+              <a:avLst/>
+            </a:prstTxWarp>
+            <a:noAutofit/>
+          </a:bodyPr>
+          <a:lstStyle/>
+          <a:p>
+            <a:pPr algn="ctr"/>
+            <a:r>
+              <a:rPr lang="en-GB" sz="2000" dirty="0">
+                <a:solidFill>
+                  <a:schemeClr val="tx1"/>
+                </a:solidFill>
+              </a:rPr>
+              <a:t>Node</a:t>
+            </a:r>
+            <a:r>
+              <a:rPr lang="en-GB" sz="2000" baseline="-25000" dirty="0">
+                <a:solidFill>
+                  <a:schemeClr val="tx1"/>
+                </a:solidFill>
+              </a:rPr>
+              <a:t>1</a:t>
+            </a:r>
+          </a:p>
+        </p:txBody>
+      </p:sp>
+      <p:cxnSp>
+        <p:nvCxnSpPr>
+          <p:cNvPr id="5" name="Egyenes összekötő nyíllal 4">
+            <a:extLst>
+              <a:ext uri="{FF2B5EF4-FFF2-40B4-BE49-F238E27FC236}">
+                <a16:creationId xmlns:a16="http://schemas.microsoft.com/office/drawing/2014/main" id="{2EC41EB5-10E0-4319-B51E-BF96F82F8AB4}"/>
+              </a:ext>
+            </a:extLst>
+          </p:cNvPr>
+          <p:cNvCxnSpPr>
+            <a:cxnSpLocks/>
+            <a:stCxn id="7" idx="3"/>
+          </p:cNvCxnSpPr>
+          <p:nvPr/>
+        </p:nvCxnSpPr>
+        <p:spPr>
+          <a:xfrm flipV="1">
+            <a:off x="3293746" y="1914347"/>
+            <a:ext cx="557180" cy="4084"/>
+          </a:xfrm>
+          <a:prstGeom prst="straightConnector1">
+            <a:avLst/>
+          </a:prstGeom>
+          <a:ln w="28575">
+            <a:solidFill>
+              <a:schemeClr val="tx1"/>
+            </a:solidFill>
+            <a:tailEnd type="triangle"/>
+          </a:ln>
+        </p:spPr>
+        <p:style>
+          <a:lnRef idx="1">
+            <a:schemeClr val="accent1"/>
+          </a:lnRef>
+          <a:fillRef idx="0">
+            <a:schemeClr val="accent1"/>
+          </a:fillRef>
+          <a:effectRef idx="0">
+            <a:schemeClr val="accent1"/>
+          </a:effectRef>
+          <a:fontRef idx="minor">
+            <a:schemeClr val="tx1"/>
+          </a:fontRef>
+        </p:style>
+      </p:cxnSp>
+      <p:sp>
+        <p:nvSpPr>
+          <p:cNvPr id="6" name="Téglalap: lekerekített 5">
+            <a:extLst>
+              <a:ext uri="{FF2B5EF4-FFF2-40B4-BE49-F238E27FC236}">
+                <a16:creationId xmlns:a16="http://schemas.microsoft.com/office/drawing/2014/main" id="{1688492F-8895-498A-97BF-FC7830641AC3}"/>
+              </a:ext>
+            </a:extLst>
+          </p:cNvPr>
+          <p:cNvSpPr/>
+          <p:nvPr/>
+        </p:nvSpPr>
+        <p:spPr>
+          <a:xfrm>
+            <a:off x="4041155" y="756179"/>
+            <a:ext cx="3081098" cy="2398082"/>
+          </a:xfrm>
+          <a:prstGeom prst="roundRect">
+            <a:avLst/>
+          </a:prstGeom>
+          <a:noFill/>
+          <a:ln w="28575">
+            <a:solidFill>
+              <a:schemeClr val="tx1"/>
+            </a:solidFill>
+          </a:ln>
+          <a:effectLst/>
+        </p:spPr>
+        <p:style>
+          <a:lnRef idx="2">
+            <a:schemeClr val="accent4">
+              <a:shade val="50000"/>
+            </a:schemeClr>
+          </a:lnRef>
+          <a:fillRef idx="1">
+            <a:schemeClr val="accent4"/>
+          </a:fillRef>
+          <a:effectRef idx="0">
+            <a:schemeClr val="accent4"/>
+          </a:effectRef>
+          <a:fontRef idx="minor">
+            <a:schemeClr val="lt1"/>
+          </a:fontRef>
+        </p:style>
+        <p:txBody>
+          <a:bodyPr rot="0" spcFirstLastPara="0" vertOverflow="overflow" horzOverflow="overflow" vert="horz" wrap="square" lIns="91440" tIns="45720" rIns="91440" bIns="45720" numCol="1" spcCol="0" rtlCol="0" fromWordArt="0" anchor="ctr" anchorCtr="0" forceAA="0" compatLnSpc="1">
+            <a:prstTxWarp prst="textNoShape">
+              <a:avLst/>
+            </a:prstTxWarp>
+            <a:noAutofit/>
+          </a:bodyPr>
+          <a:lstStyle/>
+          <a:p>
+            <a:pPr algn="ctr"/>
+            <a:endParaRPr lang="en-GB" sz="2000" baseline="-25000" dirty="0">
+              <a:solidFill>
+                <a:schemeClr val="tx1"/>
+              </a:solidFill>
+            </a:endParaRPr>
+          </a:p>
+        </p:txBody>
+      </p:sp>
+      <p:sp>
+        <p:nvSpPr>
+          <p:cNvPr id="7" name="Téglalap 6">
+            <a:extLst>
+              <a:ext uri="{FF2B5EF4-FFF2-40B4-BE49-F238E27FC236}">
+                <a16:creationId xmlns:a16="http://schemas.microsoft.com/office/drawing/2014/main" id="{66E9D0EA-8D22-4C5D-9663-A6EF0730E18E}"/>
+              </a:ext>
+            </a:extLst>
+          </p:cNvPr>
+          <p:cNvSpPr/>
+          <p:nvPr/>
+        </p:nvSpPr>
+        <p:spPr>
+          <a:xfrm>
+            <a:off x="2946275" y="1735807"/>
+            <a:ext cx="347471" cy="365247"/>
+          </a:xfrm>
+          <a:prstGeom prst="rect">
+            <a:avLst/>
+          </a:prstGeom>
+        </p:spPr>
+        <p:style>
+          <a:lnRef idx="2">
+            <a:schemeClr val="dk1">
+              <a:shade val="50000"/>
+            </a:schemeClr>
+          </a:lnRef>
+          <a:fillRef idx="1">
+            <a:schemeClr val="dk1"/>
+          </a:fillRef>
+          <a:effectRef idx="0">
+            <a:schemeClr val="dk1"/>
+          </a:effectRef>
+          <a:fontRef idx="minor">
+            <a:schemeClr val="lt1"/>
+          </a:fontRef>
+        </p:style>
+        <p:txBody>
+          <a:bodyPr rtlCol="0" anchor="ctr"/>
+          <a:lstStyle/>
+          <a:p>
+            <a:pPr algn="ctr"/>
+            <a:r>
+              <a:rPr lang="en-GB" sz="1200" b="1" dirty="0"/>
+              <a:t>P</a:t>
+            </a:r>
+            <a:r>
+              <a:rPr lang="en-GB" sz="1200" b="1" baseline="-25000" dirty="0"/>
+              <a:t>1</a:t>
+            </a:r>
+          </a:p>
+        </p:txBody>
+      </p:sp>
+      <p:sp>
+        <p:nvSpPr>
+          <p:cNvPr id="8" name="Téglalap 7">
+            <a:extLst>
+              <a:ext uri="{FF2B5EF4-FFF2-40B4-BE49-F238E27FC236}">
+                <a16:creationId xmlns:a16="http://schemas.microsoft.com/office/drawing/2014/main" id="{F5B2B208-2A7B-4BCA-9815-3E1C0DB2A12B}"/>
+              </a:ext>
+            </a:extLst>
+          </p:cNvPr>
+          <p:cNvSpPr/>
+          <p:nvPr/>
+        </p:nvSpPr>
+        <p:spPr>
+          <a:xfrm>
+            <a:off x="3850926" y="1731722"/>
+            <a:ext cx="347471" cy="365247"/>
+          </a:xfrm>
+          <a:prstGeom prst="rect">
+            <a:avLst/>
+          </a:prstGeom>
+        </p:spPr>
+        <p:style>
+          <a:lnRef idx="2">
+            <a:schemeClr val="dk1">
+              <a:shade val="50000"/>
+            </a:schemeClr>
+          </a:lnRef>
+          <a:fillRef idx="1">
+            <a:schemeClr val="dk1"/>
+          </a:fillRef>
+          <a:effectRef idx="0">
+            <a:schemeClr val="dk1"/>
+          </a:effectRef>
+          <a:fontRef idx="minor">
+            <a:schemeClr val="lt1"/>
+          </a:fontRef>
+        </p:style>
+        <p:txBody>
+          <a:bodyPr rtlCol="0" anchor="ctr"/>
+          <a:lstStyle/>
+          <a:p>
+            <a:pPr algn="ctr"/>
+            <a:r>
+              <a:rPr lang="en-GB" sz="1200" b="1" dirty="0"/>
+              <a:t>P</a:t>
+            </a:r>
+            <a:r>
+              <a:rPr lang="en-GB" sz="1200" b="1" baseline="-25000" dirty="0"/>
+              <a:t>2</a:t>
+            </a:r>
+          </a:p>
+        </p:txBody>
+      </p:sp>
+      <p:sp>
+        <p:nvSpPr>
+          <p:cNvPr id="9" name="Ellipszis 8">
+            <a:extLst>
+              <a:ext uri="{FF2B5EF4-FFF2-40B4-BE49-F238E27FC236}">
+                <a16:creationId xmlns:a16="http://schemas.microsoft.com/office/drawing/2014/main" id="{AE25B79C-A2B1-469F-A0F4-7BE9388628D3}"/>
+              </a:ext>
+            </a:extLst>
+          </p:cNvPr>
+          <p:cNvSpPr/>
+          <p:nvPr/>
+        </p:nvSpPr>
+        <p:spPr>
+          <a:xfrm>
+            <a:off x="4401916" y="1057756"/>
+            <a:ext cx="318038" cy="318038"/>
+          </a:xfrm>
+          <a:prstGeom prst="ellipse">
+            <a:avLst/>
+          </a:prstGeom>
+          <a:solidFill>
+            <a:schemeClr val="tx1"/>
+          </a:solidFill>
+          <a:ln>
+            <a:noFill/>
+          </a:ln>
+        </p:spPr>
+        <p:style>
+          <a:lnRef idx="2">
+            <a:schemeClr val="accent1">
+              <a:shade val="50000"/>
+            </a:schemeClr>
+          </a:lnRef>
+          <a:fillRef idx="1">
+            <a:schemeClr val="accent1"/>
+          </a:fillRef>
+          <a:effectRef idx="0">
+            <a:schemeClr val="accent1"/>
+          </a:effectRef>
+          <a:fontRef idx="minor">
+            <a:schemeClr val="lt1"/>
+          </a:fontRef>
+        </p:style>
+        <p:txBody>
+          <a:bodyPr rtlCol="0" anchor="ctr"/>
+          <a:lstStyle/>
+          <a:p>
+            <a:pPr algn="ctr"/>
+            <a:endParaRPr lang="en-GB"/>
+          </a:p>
+        </p:txBody>
+      </p:sp>
+      <p:sp>
+        <p:nvSpPr>
+          <p:cNvPr id="10" name="Téglalap: lekerekített 9">
+            <a:extLst>
+              <a:ext uri="{FF2B5EF4-FFF2-40B4-BE49-F238E27FC236}">
+                <a16:creationId xmlns:a16="http://schemas.microsoft.com/office/drawing/2014/main" id="{B7FCD95C-A847-4D88-A70A-8DA316EAFF90}"/>
+              </a:ext>
+            </a:extLst>
+          </p:cNvPr>
+          <p:cNvSpPr/>
+          <p:nvPr/>
+        </p:nvSpPr>
+        <p:spPr>
+          <a:xfrm>
+            <a:off x="4863685" y="1538951"/>
+            <a:ext cx="1404395" cy="776822"/>
+          </a:xfrm>
+          <a:prstGeom prst="roundRect">
+            <a:avLst/>
+          </a:prstGeom>
+          <a:solidFill>
+            <a:schemeClr val="bg1"/>
+          </a:solidFill>
+          <a:ln w="28575">
+            <a:solidFill>
+              <a:schemeClr val="tx1"/>
+            </a:solidFill>
+          </a:ln>
+          <a:effectLst/>
+        </p:spPr>
+        <p:style>
+          <a:lnRef idx="2">
+            <a:schemeClr val="accent4">
+              <a:shade val="50000"/>
+            </a:schemeClr>
+          </a:lnRef>
+          <a:fillRef idx="1">
+            <a:schemeClr val="accent4"/>
+          </a:fillRef>
+          <a:effectRef idx="0">
+            <a:schemeClr val="accent4"/>
+          </a:effectRef>
+          <a:fontRef idx="minor">
+            <a:schemeClr val="lt1"/>
+          </a:fontRef>
+        </p:style>
+        <p:txBody>
+          <a:bodyPr rot="0" spcFirstLastPara="0" vertOverflow="overflow" horzOverflow="overflow" vert="horz" wrap="square" lIns="91440" tIns="45720" rIns="91440" bIns="45720" numCol="1" spcCol="0" rtlCol="0" fromWordArt="0" anchor="ctr" anchorCtr="0" forceAA="0" compatLnSpc="1">
+            <a:prstTxWarp prst="textNoShape">
+              <a:avLst/>
+            </a:prstTxWarp>
+            <a:noAutofit/>
+          </a:bodyPr>
+          <a:lstStyle/>
+          <a:p>
+            <a:pPr algn="ctr"/>
+            <a:r>
+              <a:rPr lang="en-GB" sz="2000" dirty="0">
+                <a:solidFill>
+                  <a:schemeClr val="tx1"/>
+                </a:solidFill>
+              </a:rPr>
+              <a:t>Node</a:t>
+            </a:r>
+            <a:r>
+              <a:rPr lang="en-GB" sz="2000" baseline="-25000" dirty="0">
+                <a:solidFill>
+                  <a:schemeClr val="tx1"/>
+                </a:solidFill>
+              </a:rPr>
+              <a:t>2</a:t>
+            </a:r>
+          </a:p>
+        </p:txBody>
+      </p:sp>
+      <p:sp>
+        <p:nvSpPr>
+          <p:cNvPr id="11" name="Téglalap 10">
+            <a:extLst>
+              <a:ext uri="{FF2B5EF4-FFF2-40B4-BE49-F238E27FC236}">
+                <a16:creationId xmlns:a16="http://schemas.microsoft.com/office/drawing/2014/main" id="{6BB31859-3FB6-4A51-96C9-478D80EE8830}"/>
+              </a:ext>
+            </a:extLst>
+          </p:cNvPr>
+          <p:cNvSpPr/>
+          <p:nvPr/>
+        </p:nvSpPr>
+        <p:spPr>
+          <a:xfrm>
+            <a:off x="4673456" y="1737420"/>
+            <a:ext cx="347471" cy="365247"/>
+          </a:xfrm>
+          <a:prstGeom prst="rect">
+            <a:avLst/>
+          </a:prstGeom>
+        </p:spPr>
+        <p:style>
+          <a:lnRef idx="2">
+            <a:schemeClr val="dk1">
+              <a:shade val="50000"/>
+            </a:schemeClr>
+          </a:lnRef>
+          <a:fillRef idx="1">
+            <a:schemeClr val="dk1"/>
+          </a:fillRef>
+          <a:effectRef idx="0">
+            <a:schemeClr val="dk1"/>
+          </a:effectRef>
+          <a:fontRef idx="minor">
+            <a:schemeClr val="lt1"/>
+          </a:fontRef>
+        </p:style>
+        <p:txBody>
+          <a:bodyPr rtlCol="0" anchor="ctr"/>
+          <a:lstStyle/>
+          <a:p>
+            <a:pPr algn="ctr"/>
+            <a:r>
+              <a:rPr lang="en-GB" sz="1200" b="1" dirty="0"/>
+              <a:t>P</a:t>
+            </a:r>
+            <a:r>
+              <a:rPr lang="en-GB" sz="1200" b="1" baseline="-25000" dirty="0"/>
+              <a:t>3</a:t>
+            </a:r>
+          </a:p>
+        </p:txBody>
+      </p:sp>
+      <p:cxnSp>
+        <p:nvCxnSpPr>
+          <p:cNvPr id="12" name="Egyenes összekötő nyíllal 11">
+            <a:extLst>
+              <a:ext uri="{FF2B5EF4-FFF2-40B4-BE49-F238E27FC236}">
+                <a16:creationId xmlns:a16="http://schemas.microsoft.com/office/drawing/2014/main" id="{B11E6F66-5AC6-4E7D-9E40-19895779A470}"/>
+              </a:ext>
+            </a:extLst>
+          </p:cNvPr>
+          <p:cNvCxnSpPr>
+            <a:cxnSpLocks/>
+            <a:stCxn id="8" idx="3"/>
+            <a:endCxn id="11" idx="1"/>
+          </p:cNvCxnSpPr>
+          <p:nvPr/>
+        </p:nvCxnSpPr>
+        <p:spPr>
+          <a:xfrm>
+            <a:off x="4198397" y="1914346"/>
+            <a:ext cx="475059" cy="5698"/>
+          </a:xfrm>
+          <a:prstGeom prst="straightConnector1">
+            <a:avLst/>
+          </a:prstGeom>
+          <a:ln w="28575">
+            <a:solidFill>
+              <a:schemeClr val="tx1"/>
+            </a:solidFill>
+            <a:tailEnd type="triangle"/>
+          </a:ln>
+        </p:spPr>
+        <p:style>
+          <a:lnRef idx="1">
+            <a:schemeClr val="accent1"/>
+          </a:lnRef>
+          <a:fillRef idx="0">
+            <a:schemeClr val="accent1"/>
+          </a:fillRef>
+          <a:effectRef idx="0">
+            <a:schemeClr val="accent1"/>
+          </a:effectRef>
+          <a:fontRef idx="minor">
+            <a:schemeClr val="tx1"/>
+          </a:fontRef>
+        </p:style>
+      </p:cxnSp>
+      <p:cxnSp>
+        <p:nvCxnSpPr>
+          <p:cNvPr id="16" name="Összekötő: szögletes 15">
+            <a:extLst>
+              <a:ext uri="{FF2B5EF4-FFF2-40B4-BE49-F238E27FC236}">
+                <a16:creationId xmlns:a16="http://schemas.microsoft.com/office/drawing/2014/main" id="{139F06A1-1E3B-4866-9496-E72FB6C3978C}"/>
+              </a:ext>
+            </a:extLst>
+          </p:cNvPr>
+          <p:cNvCxnSpPr>
+            <a:cxnSpLocks/>
+            <a:stCxn id="9" idx="6"/>
+            <a:endCxn id="10" idx="0"/>
+          </p:cNvCxnSpPr>
+          <p:nvPr/>
+        </p:nvCxnSpPr>
+        <p:spPr>
+          <a:xfrm>
+            <a:off x="4719954" y="1216775"/>
+            <a:ext cx="845929" cy="322176"/>
+          </a:xfrm>
+          <a:prstGeom prst="bentConnector2">
+            <a:avLst/>
+          </a:prstGeom>
+          <a:ln w="28575">
+            <a:solidFill>
+              <a:schemeClr val="tx1"/>
+            </a:solidFill>
+            <a:prstDash val="sysDot"/>
+            <a:tailEnd type="triangle"/>
+          </a:ln>
+        </p:spPr>
+        <p:style>
+          <a:lnRef idx="1">
+            <a:schemeClr val="accent1"/>
+          </a:lnRef>
+          <a:fillRef idx="0">
+            <a:schemeClr val="accent1"/>
+          </a:fillRef>
+          <a:effectRef idx="0">
+            <a:schemeClr val="accent1"/>
+          </a:effectRef>
+          <a:fontRef idx="minor">
+            <a:schemeClr val="tx1"/>
+          </a:fontRef>
+        </p:style>
+      </p:cxnSp>
+      <p:sp>
+        <p:nvSpPr>
+          <p:cNvPr id="17" name="Ellipszis 16">
+            <a:extLst>
+              <a:ext uri="{FF2B5EF4-FFF2-40B4-BE49-F238E27FC236}">
+                <a16:creationId xmlns:a16="http://schemas.microsoft.com/office/drawing/2014/main" id="{8BF1B6D7-347C-42AA-8F34-161FA5CD3DB7}"/>
+              </a:ext>
+            </a:extLst>
+          </p:cNvPr>
+          <p:cNvSpPr/>
+          <p:nvPr/>
+        </p:nvSpPr>
+        <p:spPr>
+          <a:xfrm>
+            <a:off x="6484149" y="2564996"/>
+            <a:ext cx="293962" cy="293962"/>
+          </a:xfrm>
+          <a:prstGeom prst="ellipse">
+            <a:avLst/>
+          </a:prstGeom>
+          <a:solidFill>
+            <a:schemeClr val="tx1"/>
+          </a:solidFill>
+          <a:ln>
+            <a:noFill/>
+          </a:ln>
+        </p:spPr>
+        <p:style>
+          <a:lnRef idx="2">
+            <a:schemeClr val="accent1">
+              <a:shade val="50000"/>
+            </a:schemeClr>
+          </a:lnRef>
+          <a:fillRef idx="1">
+            <a:schemeClr val="accent1"/>
+          </a:fillRef>
+          <a:effectRef idx="0">
+            <a:schemeClr val="accent1"/>
+          </a:effectRef>
+          <a:fontRef idx="minor">
+            <a:schemeClr val="lt1"/>
+          </a:fontRef>
+        </p:style>
+        <p:txBody>
+          <a:bodyPr rtlCol="0" anchor="ctr"/>
+          <a:lstStyle/>
+          <a:p>
+            <a:pPr algn="ctr"/>
+            <a:endParaRPr lang="en-GB"/>
+          </a:p>
+        </p:txBody>
+      </p:sp>
+      <p:sp>
+        <p:nvSpPr>
+          <p:cNvPr id="18" name="Ellipszis 17">
+            <a:extLst>
+              <a:ext uri="{FF2B5EF4-FFF2-40B4-BE49-F238E27FC236}">
+                <a16:creationId xmlns:a16="http://schemas.microsoft.com/office/drawing/2014/main" id="{67FB6E02-B305-49DC-AE7B-C70F1443D161}"/>
+              </a:ext>
+            </a:extLst>
+          </p:cNvPr>
+          <p:cNvSpPr/>
+          <p:nvPr/>
+        </p:nvSpPr>
+        <p:spPr>
+          <a:xfrm>
+            <a:off x="6443817" y="2527236"/>
+            <a:ext cx="369482" cy="369482"/>
+          </a:xfrm>
+          <a:prstGeom prst="ellipse">
+            <a:avLst/>
+          </a:prstGeom>
+          <a:noFill/>
+          <a:ln w="28575">
+            <a:solidFill>
+              <a:schemeClr val="tx1"/>
+            </a:solidFill>
+          </a:ln>
+        </p:spPr>
+        <p:style>
+          <a:lnRef idx="2">
+            <a:schemeClr val="accent1">
+              <a:shade val="50000"/>
+            </a:schemeClr>
+          </a:lnRef>
+          <a:fillRef idx="1">
+            <a:schemeClr val="accent1"/>
+          </a:fillRef>
+          <a:effectRef idx="0">
+            <a:schemeClr val="accent1"/>
+          </a:effectRef>
+          <a:fontRef idx="minor">
+            <a:schemeClr val="lt1"/>
+          </a:fontRef>
+        </p:style>
+        <p:txBody>
+          <a:bodyPr rtlCol="0" anchor="ctr"/>
+          <a:lstStyle/>
+          <a:p>
+            <a:pPr algn="ctr"/>
+            <a:endParaRPr lang="en-GB"/>
+          </a:p>
+        </p:txBody>
+      </p:sp>
+      <p:cxnSp>
+        <p:nvCxnSpPr>
+          <p:cNvPr id="24" name="Összekötő: szögletes 23">
+            <a:extLst>
+              <a:ext uri="{FF2B5EF4-FFF2-40B4-BE49-F238E27FC236}">
+                <a16:creationId xmlns:a16="http://schemas.microsoft.com/office/drawing/2014/main" id="{CB460A45-3284-4242-BFFF-C7C0D55DD233}"/>
+              </a:ext>
+            </a:extLst>
+          </p:cNvPr>
+          <p:cNvCxnSpPr>
+            <a:cxnSpLocks/>
+            <a:stCxn id="10" idx="2"/>
+            <a:endCxn id="18" idx="2"/>
+          </p:cNvCxnSpPr>
+          <p:nvPr/>
+        </p:nvCxnSpPr>
+        <p:spPr>
+          <a:xfrm rot="16200000" flipH="1">
+            <a:off x="5806748" y="2074908"/>
+            <a:ext cx="396204" cy="877934"/>
+          </a:xfrm>
+          <a:prstGeom prst="bentConnector2">
+            <a:avLst/>
+          </a:prstGeom>
+          <a:ln w="28575">
+            <a:solidFill>
+              <a:schemeClr val="tx1"/>
+            </a:solidFill>
+            <a:prstDash val="sysDot"/>
+            <a:tailEnd type="triangle"/>
+          </a:ln>
+        </p:spPr>
+        <p:style>
+          <a:lnRef idx="1">
+            <a:schemeClr val="accent1"/>
+          </a:lnRef>
+          <a:fillRef idx="0">
+            <a:schemeClr val="accent1"/>
+          </a:fillRef>
+          <a:effectRef idx="0">
+            <a:schemeClr val="accent1"/>
+          </a:effectRef>
+          <a:fontRef idx="minor">
+            <a:schemeClr val="tx1"/>
+          </a:fontRef>
+        </p:style>
+      </p:cxnSp>
+    </p:spTree>
+    <p:extLst>
+      <p:ext uri="{BB962C8B-B14F-4D97-AF65-F5344CB8AC3E}">
+        <p14:creationId xmlns:p14="http://schemas.microsoft.com/office/powerpoint/2010/main" val="3783429225"/>
       </p:ext>
     </p:extLst>
   </p:cSld>

</xml_diff>

<commit_message>
v4 (review javítás nélkül)
</commit_message>
<xml_diff>
--- a/ppts/diagrams.pptx
+++ b/ppts/diagrams.pptx
@@ -267,7 +267,7 @@
           <a:p>
             <a:fld id="{6E246BA4-EDD2-4842-89DC-A5984E6A9B8D}" type="datetimeFigureOut">
               <a:rPr lang="en-GB" smtClean="0"/>
-              <a:t>24/10/2021</a:t>
+              <a:t>25/10/2021</a:t>
             </a:fld>
             <a:endParaRPr lang="en-GB"/>
           </a:p>
@@ -467,7 +467,7 @@
           <a:p>
             <a:fld id="{6E246BA4-EDD2-4842-89DC-A5984E6A9B8D}" type="datetimeFigureOut">
               <a:rPr lang="en-GB" smtClean="0"/>
-              <a:t>24/10/2021</a:t>
+              <a:t>25/10/2021</a:t>
             </a:fld>
             <a:endParaRPr lang="en-GB"/>
           </a:p>
@@ -677,7 +677,7 @@
           <a:p>
             <a:fld id="{6E246BA4-EDD2-4842-89DC-A5984E6A9B8D}" type="datetimeFigureOut">
               <a:rPr lang="en-GB" smtClean="0"/>
-              <a:t>24/10/2021</a:t>
+              <a:t>25/10/2021</a:t>
             </a:fld>
             <a:endParaRPr lang="en-GB"/>
           </a:p>
@@ -877,7 +877,7 @@
           <a:p>
             <a:fld id="{6E246BA4-EDD2-4842-89DC-A5984E6A9B8D}" type="datetimeFigureOut">
               <a:rPr lang="en-GB" smtClean="0"/>
-              <a:t>24/10/2021</a:t>
+              <a:t>25/10/2021</a:t>
             </a:fld>
             <a:endParaRPr lang="en-GB"/>
           </a:p>
@@ -1153,7 +1153,7 @@
           <a:p>
             <a:fld id="{6E246BA4-EDD2-4842-89DC-A5984E6A9B8D}" type="datetimeFigureOut">
               <a:rPr lang="en-GB" smtClean="0"/>
-              <a:t>24/10/2021</a:t>
+              <a:t>25/10/2021</a:t>
             </a:fld>
             <a:endParaRPr lang="en-GB"/>
           </a:p>
@@ -1421,7 +1421,7 @@
           <a:p>
             <a:fld id="{6E246BA4-EDD2-4842-89DC-A5984E6A9B8D}" type="datetimeFigureOut">
               <a:rPr lang="en-GB" smtClean="0"/>
-              <a:t>24/10/2021</a:t>
+              <a:t>25/10/2021</a:t>
             </a:fld>
             <a:endParaRPr lang="en-GB"/>
           </a:p>
@@ -1836,7 +1836,7 @@
           <a:p>
             <a:fld id="{6E246BA4-EDD2-4842-89DC-A5984E6A9B8D}" type="datetimeFigureOut">
               <a:rPr lang="en-GB" smtClean="0"/>
-              <a:t>24/10/2021</a:t>
+              <a:t>25/10/2021</a:t>
             </a:fld>
             <a:endParaRPr lang="en-GB"/>
           </a:p>
@@ -1978,7 +1978,7 @@
           <a:p>
             <a:fld id="{6E246BA4-EDD2-4842-89DC-A5984E6A9B8D}" type="datetimeFigureOut">
               <a:rPr lang="en-GB" smtClean="0"/>
-              <a:t>24/10/2021</a:t>
+              <a:t>25/10/2021</a:t>
             </a:fld>
             <a:endParaRPr lang="en-GB"/>
           </a:p>
@@ -2091,7 +2091,7 @@
           <a:p>
             <a:fld id="{6E246BA4-EDD2-4842-89DC-A5984E6A9B8D}" type="datetimeFigureOut">
               <a:rPr lang="en-GB" smtClean="0"/>
-              <a:t>24/10/2021</a:t>
+              <a:t>25/10/2021</a:t>
             </a:fld>
             <a:endParaRPr lang="en-GB"/>
           </a:p>
@@ -2404,7 +2404,7 @@
           <a:p>
             <a:fld id="{6E246BA4-EDD2-4842-89DC-A5984E6A9B8D}" type="datetimeFigureOut">
               <a:rPr lang="en-GB" smtClean="0"/>
-              <a:t>24/10/2021</a:t>
+              <a:t>25/10/2021</a:t>
             </a:fld>
             <a:endParaRPr lang="en-GB"/>
           </a:p>
@@ -2693,7 +2693,7 @@
           <a:p>
             <a:fld id="{6E246BA4-EDD2-4842-89DC-A5984E6A9B8D}" type="datetimeFigureOut">
               <a:rPr lang="en-GB" smtClean="0"/>
-              <a:t>24/10/2021</a:t>
+              <a:t>25/10/2021</a:t>
             </a:fld>
             <a:endParaRPr lang="en-GB"/>
           </a:p>
@@ -2936,7 +2936,7 @@
           <a:p>
             <a:fld id="{6E246BA4-EDD2-4842-89DC-A5984E6A9B8D}" type="datetimeFigureOut">
               <a:rPr lang="en-GB" smtClean="0"/>
-              <a:t>24/10/2021</a:t>
+              <a:t>25/10/2021</a:t>
             </a:fld>
             <a:endParaRPr lang="en-GB"/>
           </a:p>
@@ -3355,10 +3355,10 @@
       </p:grpSpPr>
       <p:sp>
         <p:nvSpPr>
-          <p:cNvPr id="4" name="Téglalap: lekerekített 3">
-            <a:extLst>
-              <a:ext uri="{FF2B5EF4-FFF2-40B4-BE49-F238E27FC236}">
-                <a16:creationId xmlns:a16="http://schemas.microsoft.com/office/drawing/2014/main" id="{F5D8B0F4-92A7-40B7-9744-C800867D227A}"/>
+          <p:cNvPr id="5" name="Ellipszis 4">
+            <a:extLst>
+              <a:ext uri="{FF2B5EF4-FFF2-40B4-BE49-F238E27FC236}">
+                <a16:creationId xmlns:a16="http://schemas.microsoft.com/office/drawing/2014/main" id="{034A4C3F-C189-4031-8CDB-2801C12832F2}"/>
               </a:ext>
             </a:extLst>
           </p:cNvPr>
@@ -3367,10 +3367,10 @@
         </p:nvSpPr>
         <p:spPr>
           <a:xfrm>
-            <a:off x="3968222" y="1131702"/>
-            <a:ext cx="1413086" cy="977464"/>
-          </a:xfrm>
-          <a:prstGeom prst="roundRect">
+            <a:off x="1151902" y="1379459"/>
+            <a:ext cx="467676" cy="467676"/>
+          </a:xfrm>
+          <a:prstGeom prst="ellipse">
             <a:avLst/>
           </a:prstGeom>
           <a:solidFill>
@@ -3409,70 +3409,6 @@
           <a:lstStyle/>
           <a:p>
             <a:pPr algn="ctr"/>
-            <a:endParaRPr lang="en-GB" sz="2000" dirty="0">
-              <a:solidFill>
-                <a:schemeClr val="tx2"/>
-              </a:solidFill>
-            </a:endParaRPr>
-          </a:p>
-        </p:txBody>
-      </p:sp>
-      <p:sp>
-        <p:nvSpPr>
-          <p:cNvPr id="5" name="Ellipszis 4">
-            <a:extLst>
-              <a:ext uri="{FF2B5EF4-FFF2-40B4-BE49-F238E27FC236}">
-                <a16:creationId xmlns:a16="http://schemas.microsoft.com/office/drawing/2014/main" id="{034A4C3F-C189-4031-8CDB-2801C12832F2}"/>
-              </a:ext>
-            </a:extLst>
-          </p:cNvPr>
-          <p:cNvSpPr/>
-          <p:nvPr/>
-        </p:nvSpPr>
-        <p:spPr>
-          <a:xfrm>
-            <a:off x="1939480" y="1394307"/>
-            <a:ext cx="467676" cy="467676"/>
-          </a:xfrm>
-          <a:prstGeom prst="ellipse">
-            <a:avLst/>
-          </a:prstGeom>
-          <a:solidFill>
-            <a:schemeClr val="bg1"/>
-          </a:solidFill>
-          <a:ln w="28575">
-            <a:solidFill>
-              <a:schemeClr val="tx1"/>
-            </a:solidFill>
-          </a:ln>
-          <a:effectLst/>
-        </p:spPr>
-        <p:style>
-          <a:lnRef idx="2">
-            <a:schemeClr val="accent4">
-              <a:shade val="50000"/>
-            </a:schemeClr>
-          </a:lnRef>
-          <a:fillRef idx="1">
-            <a:schemeClr val="accent4"/>
-          </a:fillRef>
-          <a:effectRef idx="0">
-            <a:schemeClr val="accent4"/>
-          </a:effectRef>
-          <a:fontRef idx="minor">
-            <a:schemeClr val="lt1"/>
-          </a:fontRef>
-        </p:style>
-        <p:txBody>
-          <a:bodyPr rot="0" spcFirstLastPara="0" vertOverflow="overflow" horzOverflow="overflow" vert="horz" wrap="square" lIns="91440" tIns="45720" rIns="91440" bIns="45720" numCol="1" spcCol="0" rtlCol="0" fromWordArt="0" anchor="ctr" anchorCtr="0" forceAA="0" compatLnSpc="1">
-            <a:prstTxWarp prst="textNoShape">
-              <a:avLst/>
-            </a:prstTxWarp>
-            <a:noAutofit/>
-          </a:bodyPr>
-          <a:lstStyle/>
-          <a:p>
-            <a:pPr algn="ctr"/>
             <a:r>
               <a:rPr lang="en-GB" sz="1200" b="1" dirty="0">
                 <a:solidFill>
@@ -3506,7 +3442,7 @@
         </p:nvSpPr>
         <p:spPr>
           <a:xfrm>
-            <a:off x="6972759" y="1363027"/>
+            <a:off x="5363677" y="1348179"/>
             <a:ext cx="497810" cy="497810"/>
           </a:xfrm>
           <a:prstGeom prst="ellipse">
@@ -3615,7 +3551,7 @@
         </p:nvSpPr>
         <p:spPr>
           <a:xfrm>
-            <a:off x="1939480" y="607024"/>
+            <a:off x="1151902" y="592176"/>
             <a:ext cx="467676" cy="467676"/>
           </a:xfrm>
           <a:prstGeom prst="ellipse">
@@ -3690,7 +3626,7 @@
         </p:nvSpPr>
         <p:spPr>
           <a:xfrm>
-            <a:off x="1939480" y="2181590"/>
+            <a:off x="1151902" y="2166742"/>
             <a:ext cx="467676" cy="467676"/>
           </a:xfrm>
           <a:prstGeom prst="ellipse">
@@ -3799,7 +3735,7 @@
         </p:nvSpPr>
         <p:spPr>
           <a:xfrm>
-            <a:off x="6985354" y="605886"/>
+            <a:off x="5376272" y="591038"/>
             <a:ext cx="467676" cy="467676"/>
           </a:xfrm>
           <a:prstGeom prst="ellipse">
@@ -3908,7 +3844,7 @@
         </p:nvSpPr>
         <p:spPr>
           <a:xfrm>
-            <a:off x="6985354" y="2180452"/>
+            <a:off x="5376272" y="2165604"/>
             <a:ext cx="467676" cy="467676"/>
           </a:xfrm>
           <a:prstGeom prst="ellipse">
@@ -4017,8 +3953,8 @@
         </p:nvSpPr>
         <p:spPr>
           <a:xfrm>
-            <a:off x="1370076" y="189870"/>
-            <a:ext cx="1600618" cy="2876550"/>
+            <a:off x="672375" y="336544"/>
+            <a:ext cx="1420864" cy="2553506"/>
           </a:xfrm>
           <a:prstGeom prst="ellipse">
             <a:avLst/>
@@ -4080,8 +4016,8 @@
         </p:nvSpPr>
         <p:spPr>
           <a:xfrm>
-            <a:off x="6418883" y="179207"/>
-            <a:ext cx="1600618" cy="2876550"/>
+            <a:off x="4893744" y="315218"/>
+            <a:ext cx="1432732" cy="2574832"/>
           </a:xfrm>
           <a:prstGeom prst="ellipse">
             <a:avLst/>
@@ -4143,7 +4079,7 @@
         </p:nvSpPr>
         <p:spPr>
           <a:xfrm>
-            <a:off x="1255390" y="3058745"/>
+            <a:off x="467812" y="3043897"/>
             <a:ext cx="1829989" cy="369332"/>
           </a:xfrm>
           <a:prstGeom prst="rect">
@@ -4179,7 +4115,7 @@
         </p:nvSpPr>
         <p:spPr>
           <a:xfrm>
-            <a:off x="6246761" y="3059668"/>
+            <a:off x="4637679" y="3044820"/>
             <a:ext cx="1955023" cy="369332"/>
           </a:xfrm>
           <a:prstGeom prst="rect">
@@ -4215,7 +4151,7 @@
         </p:nvSpPr>
         <p:spPr>
           <a:xfrm>
-            <a:off x="4425855" y="1374477"/>
+            <a:off x="3232352" y="1364388"/>
             <a:ext cx="497818" cy="497818"/>
           </a:xfrm>
           <a:prstGeom prst="ellipse">
@@ -4324,7 +4260,7 @@
         </p:nvSpPr>
         <p:spPr>
           <a:xfrm>
-            <a:off x="3211179" y="543922"/>
+            <a:off x="2440048" y="1210165"/>
             <a:ext cx="415499" cy="369332"/>
           </a:xfrm>
           <a:prstGeom prst="rect">
@@ -4365,7 +4301,7 @@
         </p:nvSpPr>
         <p:spPr>
           <a:xfrm>
-            <a:off x="4402895" y="2492241"/>
+            <a:off x="3215741" y="2010172"/>
             <a:ext cx="543740" cy="369332"/>
           </a:xfrm>
           <a:prstGeom prst="rect">
@@ -4406,7 +4342,7 @@
         </p:nvSpPr>
         <p:spPr>
           <a:xfrm>
-            <a:off x="5609817" y="541709"/>
+            <a:off x="4047333" y="1198867"/>
             <a:ext cx="529247" cy="369332"/>
           </a:xfrm>
           <a:prstGeom prst="rect">
@@ -4447,7 +4383,7 @@
         </p:nvSpPr>
         <p:spPr>
           <a:xfrm>
-            <a:off x="852084" y="4684822"/>
+            <a:off x="7389362" y="462178"/>
             <a:ext cx="1404395" cy="765426"/>
           </a:xfrm>
           <a:prstGeom prst="roundRect">
@@ -4524,7 +4460,7 @@
         </p:nvCxnSpPr>
         <p:spPr>
           <a:xfrm flipV="1">
-            <a:off x="2427228" y="5060217"/>
+            <a:off x="8964506" y="837573"/>
             <a:ext cx="1163639" cy="4085"/>
           </a:xfrm>
           <a:prstGeom prst="straightConnector1">
@@ -4566,7 +4502,7 @@
         </p:nvSpPr>
         <p:spPr>
           <a:xfrm>
-            <a:off x="3781096" y="4679124"/>
+            <a:off x="10318374" y="456480"/>
             <a:ext cx="1404395" cy="776822"/>
           </a:xfrm>
           <a:prstGeom prst="roundRect">
@@ -4641,7 +4577,7 @@
         </p:nvSpPr>
         <p:spPr>
           <a:xfrm>
-            <a:off x="2079757" y="4881678"/>
+            <a:off x="8617035" y="659034"/>
             <a:ext cx="347471" cy="365247"/>
           </a:xfrm>
           <a:prstGeom prst="rect">
@@ -4694,7 +4630,7 @@
         </p:nvSpPr>
         <p:spPr>
           <a:xfrm>
-            <a:off x="3590867" y="4877593"/>
+            <a:off x="10128145" y="654949"/>
             <a:ext cx="347471" cy="365247"/>
           </a:xfrm>
           <a:prstGeom prst="rect">
@@ -4747,7 +4683,7 @@
         </p:nvSpPr>
         <p:spPr>
           <a:xfrm>
-            <a:off x="6094126" y="4680783"/>
+            <a:off x="7415040" y="1898506"/>
             <a:ext cx="1404395" cy="747024"/>
           </a:xfrm>
           <a:prstGeom prst="roundRect">
@@ -4825,7 +4761,7 @@
         </p:nvCxnSpPr>
         <p:spPr>
           <a:xfrm flipV="1">
-            <a:off x="7669270" y="5049570"/>
+            <a:off x="8990184" y="2267293"/>
             <a:ext cx="489097" cy="1492"/>
           </a:xfrm>
           <a:prstGeom prst="straightConnector1">
@@ -4867,7 +4803,7 @@
         </p:nvSpPr>
         <p:spPr>
           <a:xfrm>
-            <a:off x="9970512" y="4699285"/>
+            <a:off x="11291426" y="1917008"/>
             <a:ext cx="1404395" cy="721864"/>
           </a:xfrm>
           <a:prstGeom prst="roundRect">
@@ -4942,7 +4878,7 @@
         </p:nvSpPr>
         <p:spPr>
           <a:xfrm>
-            <a:off x="7321799" y="4868438"/>
+            <a:off x="8642713" y="2086161"/>
             <a:ext cx="347471" cy="365247"/>
           </a:xfrm>
           <a:prstGeom prst="rect">
@@ -4995,7 +4931,7 @@
         </p:nvSpPr>
         <p:spPr>
           <a:xfrm>
-            <a:off x="9780283" y="4870275"/>
+            <a:off x="11101197" y="2087998"/>
             <a:ext cx="347471" cy="365247"/>
           </a:xfrm>
           <a:prstGeom prst="rect">
@@ -5048,7 +4984,7 @@
         </p:nvSpPr>
         <p:spPr>
           <a:xfrm>
-            <a:off x="8158367" y="4799880"/>
+            <a:off x="9479281" y="2017603"/>
             <a:ext cx="1152300" cy="499379"/>
           </a:xfrm>
           <a:prstGeom prst="roundRect">
@@ -5123,7 +5059,7 @@
         </p:nvCxnSpPr>
         <p:spPr>
           <a:xfrm>
-            <a:off x="9310667" y="5049570"/>
+            <a:off x="10631581" y="2267293"/>
             <a:ext cx="469616" cy="3329"/>
           </a:xfrm>
           <a:prstGeom prst="straightConnector1">
@@ -5153,27 +5089,28 @@
       </p:cxnSp>
       <p:cxnSp>
         <p:nvCxnSpPr>
-          <p:cNvPr id="74" name="Összekötő: görbe 73">
-            <a:extLst>
-              <a:ext uri="{FF2B5EF4-FFF2-40B4-BE49-F238E27FC236}">
-                <a16:creationId xmlns:a16="http://schemas.microsoft.com/office/drawing/2014/main" id="{94FC7816-21F7-4087-AFE3-27E1748EB0E8}"/>
+          <p:cNvPr id="75" name="Összekötő: görbe 74">
+            <a:extLst>
+              <a:ext uri="{FF2B5EF4-FFF2-40B4-BE49-F238E27FC236}">
+                <a16:creationId xmlns:a16="http://schemas.microsoft.com/office/drawing/2014/main" id="{E234763A-3574-4148-859D-87CA342C4D0C}"/>
               </a:ext>
             </a:extLst>
           </p:cNvPr>
           <p:cNvCxnSpPr>
-            <a:stCxn id="5" idx="7"/>
-            <a:endCxn id="20" idx="1"/>
+            <a:cxnSpLocks/>
+            <a:stCxn id="20" idx="3"/>
+            <a:endCxn id="20" idx="5"/>
           </p:cNvCxnSpPr>
           <p:nvPr/>
         </p:nvCxnSpPr>
         <p:spPr>
-          <a:xfrm rot="5400000" flipH="1" flipV="1">
-            <a:off x="3411004" y="375043"/>
-            <a:ext cx="15416" cy="2160093"/>
+          <a:xfrm rot="16200000" flipH="1">
+            <a:off x="3481261" y="1613297"/>
+            <a:ext cx="12700" cy="352010"/>
           </a:xfrm>
           <a:prstGeom prst="curvedConnector3">
             <a:avLst>
-              <a:gd name="adj1" fmla="val 3390374"/>
+              <a:gd name="adj1" fmla="val 2149047"/>
             </a:avLst>
           </a:prstGeom>
           <a:ln w="19050">
@@ -5198,33 +5135,65 @@
           </a:fontRef>
         </p:style>
       </p:cxnSp>
+      <p:sp>
+        <p:nvSpPr>
+          <p:cNvPr id="85" name="Szövegdoboz 84">
+            <a:extLst>
+              <a:ext uri="{FF2B5EF4-FFF2-40B4-BE49-F238E27FC236}">
+                <a16:creationId xmlns:a16="http://schemas.microsoft.com/office/drawing/2014/main" id="{EFEC32D4-1A12-4FBA-B369-F1A3D515913E}"/>
+              </a:ext>
+            </a:extLst>
+          </p:cNvPr>
+          <p:cNvSpPr txBox="1"/>
+          <p:nvPr/>
+        </p:nvSpPr>
+        <p:spPr>
+          <a:xfrm>
+            <a:off x="2794376" y="3049447"/>
+            <a:ext cx="1417376" cy="369332"/>
+          </a:xfrm>
+          <a:prstGeom prst="rect">
+            <a:avLst/>
+          </a:prstGeom>
+          <a:noFill/>
+        </p:spPr>
+        <p:txBody>
+          <a:bodyPr wrap="none" rtlCol="0">
+            <a:spAutoFit/>
+          </a:bodyPr>
+          <a:lstStyle/>
+          <a:p>
+            <a:pPr algn="ctr"/>
+            <a:r>
+              <a:rPr lang="en-GB" dirty="0"/>
+              <a:t>activity node</a:t>
+            </a:r>
+          </a:p>
+        </p:txBody>
+      </p:sp>
       <p:cxnSp>
         <p:nvCxnSpPr>
-          <p:cNvPr id="75" name="Összekötő: görbe 74">
-            <a:extLst>
-              <a:ext uri="{FF2B5EF4-FFF2-40B4-BE49-F238E27FC236}">
-                <a16:creationId xmlns:a16="http://schemas.microsoft.com/office/drawing/2014/main" id="{E234763A-3574-4148-859D-87CA342C4D0C}"/>
+          <p:cNvPr id="29" name="Egyenes összekötő nyíllal 28">
+            <a:extLst>
+              <a:ext uri="{FF2B5EF4-FFF2-40B4-BE49-F238E27FC236}">
+                <a16:creationId xmlns:a16="http://schemas.microsoft.com/office/drawing/2014/main" id="{B4479089-131A-4290-B77F-01DFB0F15787}"/>
               </a:ext>
             </a:extLst>
           </p:cNvPr>
           <p:cNvCxnSpPr>
             <a:cxnSpLocks/>
-            <a:stCxn id="20" idx="2"/>
-            <a:endCxn id="20" idx="6"/>
+            <a:stCxn id="13" idx="6"/>
+            <a:endCxn id="20" idx="2"/>
           </p:cNvCxnSpPr>
           <p:nvPr/>
         </p:nvCxnSpPr>
         <p:spPr>
-          <a:xfrm rot="10800000" flipH="1">
-            <a:off x="4425855" y="1623386"/>
-            <a:ext cx="497818" cy="12700"/>
-          </a:xfrm>
-          <a:prstGeom prst="curvedConnector5">
-            <a:avLst>
-              <a:gd name="adj1" fmla="val -45920"/>
-              <a:gd name="adj2" fmla="val -7340087"/>
-              <a:gd name="adj3" fmla="val 145920"/>
-            </a:avLst>
+          <a:xfrm>
+            <a:off x="2093239" y="1613297"/>
+            <a:ext cx="1139113" cy="0"/>
+          </a:xfrm>
+          <a:prstGeom prst="straightConnector1">
+            <a:avLst/>
           </a:prstGeom>
           <a:ln w="19050">
             <a:solidFill>
@@ -5250,29 +5219,27 @@
       </p:cxnSp>
       <p:cxnSp>
         <p:nvCxnSpPr>
-          <p:cNvPr id="80" name="Összekötő: görbe 79">
-            <a:extLst>
-              <a:ext uri="{FF2B5EF4-FFF2-40B4-BE49-F238E27FC236}">
-                <a16:creationId xmlns:a16="http://schemas.microsoft.com/office/drawing/2014/main" id="{95E5BE74-C914-4ADD-9450-AD7483CC90C9}"/>
+          <p:cNvPr id="76" name="Egyenes összekötő nyíllal 75">
+            <a:extLst>
+              <a:ext uri="{FF2B5EF4-FFF2-40B4-BE49-F238E27FC236}">
+                <a16:creationId xmlns:a16="http://schemas.microsoft.com/office/drawing/2014/main" id="{BE1843E4-565B-4F30-A652-801A5A99992D}"/>
               </a:ext>
             </a:extLst>
           </p:cNvPr>
           <p:cNvCxnSpPr>
             <a:cxnSpLocks/>
-            <a:stCxn id="20" idx="7"/>
-            <a:endCxn id="7" idx="1"/>
+            <a:stCxn id="20" idx="6"/>
+            <a:endCxn id="14" idx="2"/>
           </p:cNvCxnSpPr>
           <p:nvPr/>
         </p:nvCxnSpPr>
         <p:spPr>
-          <a:xfrm rot="5400000" flipH="1" flipV="1">
-            <a:off x="5942490" y="344210"/>
-            <a:ext cx="11451" cy="2194893"/>
-          </a:xfrm>
-          <a:prstGeom prst="curvedConnector3">
-            <a:avLst>
-              <a:gd name="adj1" fmla="val 4396594"/>
-            </a:avLst>
+          <a:xfrm flipV="1">
+            <a:off x="3730170" y="1602634"/>
+            <a:ext cx="1163574" cy="10663"/>
+          </a:xfrm>
+          <a:prstGeom prst="straightConnector1">
+            <a:avLst/>
           </a:prstGeom>
           <a:ln w="19050">
             <a:solidFill>
@@ -5298,10 +5265,596 @@
       </p:cxnSp>
       <p:sp>
         <p:nvSpPr>
-          <p:cNvPr id="85" name="Szövegdoboz 84">
-            <a:extLst>
-              <a:ext uri="{FF2B5EF4-FFF2-40B4-BE49-F238E27FC236}">
-                <a16:creationId xmlns:a16="http://schemas.microsoft.com/office/drawing/2014/main" id="{EFEC32D4-1A12-4FBA-B369-F1A3D515913E}"/>
+          <p:cNvPr id="126" name="Ellipszis 125">
+            <a:extLst>
+              <a:ext uri="{FF2B5EF4-FFF2-40B4-BE49-F238E27FC236}">
+                <a16:creationId xmlns:a16="http://schemas.microsoft.com/office/drawing/2014/main" id="{67CF4ABC-61FE-4591-A7EB-E73D346EA60E}"/>
+              </a:ext>
+            </a:extLst>
+          </p:cNvPr>
+          <p:cNvSpPr/>
+          <p:nvPr/>
+        </p:nvSpPr>
+        <p:spPr>
+          <a:xfrm>
+            <a:off x="1151902" y="4503463"/>
+            <a:ext cx="467676" cy="467676"/>
+          </a:xfrm>
+          <a:prstGeom prst="ellipse">
+            <a:avLst/>
+          </a:prstGeom>
+          <a:solidFill>
+            <a:schemeClr val="bg1"/>
+          </a:solidFill>
+          <a:ln w="28575">
+            <a:solidFill>
+              <a:schemeClr val="tx1"/>
+            </a:solidFill>
+          </a:ln>
+          <a:effectLst/>
+        </p:spPr>
+        <p:style>
+          <a:lnRef idx="2">
+            <a:schemeClr val="accent4">
+              <a:shade val="50000"/>
+            </a:schemeClr>
+          </a:lnRef>
+          <a:fillRef idx="1">
+            <a:schemeClr val="accent4"/>
+          </a:fillRef>
+          <a:effectRef idx="0">
+            <a:schemeClr val="accent4"/>
+          </a:effectRef>
+          <a:fontRef idx="minor">
+            <a:schemeClr val="lt1"/>
+          </a:fontRef>
+        </p:style>
+        <p:txBody>
+          <a:bodyPr rot="0" spcFirstLastPara="0" vertOverflow="overflow" horzOverflow="overflow" vert="horz" wrap="square" lIns="91440" tIns="45720" rIns="91440" bIns="45720" numCol="1" spcCol="0" rtlCol="0" fromWordArt="0" anchor="ctr" anchorCtr="0" forceAA="0" compatLnSpc="1">
+            <a:prstTxWarp prst="textNoShape">
+              <a:avLst/>
+            </a:prstTxWarp>
+            <a:noAutofit/>
+          </a:bodyPr>
+          <a:lstStyle/>
+          <a:p>
+            <a:pPr algn="ctr"/>
+            <a:r>
+              <a:rPr lang="en-GB" sz="1200" b="1" dirty="0">
+                <a:solidFill>
+                  <a:schemeClr val="tx1"/>
+                </a:solidFill>
+              </a:rPr>
+              <a:t>S</a:t>
+            </a:r>
+            <a:r>
+              <a:rPr lang="en-GB" sz="1200" b="1" baseline="-25000" dirty="0">
+                <a:solidFill>
+                  <a:schemeClr val="tx1"/>
+                </a:solidFill>
+              </a:rPr>
+              <a:t>F</a:t>
+            </a:r>
+          </a:p>
+        </p:txBody>
+      </p:sp>
+      <p:sp>
+        <p:nvSpPr>
+          <p:cNvPr id="127" name="Ellipszis 126">
+            <a:extLst>
+              <a:ext uri="{FF2B5EF4-FFF2-40B4-BE49-F238E27FC236}">
+                <a16:creationId xmlns:a16="http://schemas.microsoft.com/office/drawing/2014/main" id="{1D9CB8A5-FC7B-4FC0-BA1A-68B6CB251339}"/>
+              </a:ext>
+            </a:extLst>
+          </p:cNvPr>
+          <p:cNvSpPr/>
+          <p:nvPr/>
+        </p:nvSpPr>
+        <p:spPr>
+          <a:xfrm>
+            <a:off x="5363677" y="4472183"/>
+            <a:ext cx="497810" cy="497810"/>
+          </a:xfrm>
+          <a:prstGeom prst="ellipse">
+            <a:avLst/>
+          </a:prstGeom>
+          <a:solidFill>
+            <a:schemeClr val="bg1"/>
+          </a:solidFill>
+          <a:ln w="28575">
+            <a:solidFill>
+              <a:schemeClr val="tx1"/>
+            </a:solidFill>
+          </a:ln>
+          <a:effectLst/>
+        </p:spPr>
+        <p:style>
+          <a:lnRef idx="2">
+            <a:schemeClr val="accent4">
+              <a:shade val="50000"/>
+            </a:schemeClr>
+          </a:lnRef>
+          <a:fillRef idx="1">
+            <a:schemeClr val="accent4"/>
+          </a:fillRef>
+          <a:effectRef idx="0">
+            <a:schemeClr val="accent4"/>
+          </a:effectRef>
+          <a:fontRef idx="minor">
+            <a:schemeClr val="lt1"/>
+          </a:fontRef>
+        </p:style>
+        <p:txBody>
+          <a:bodyPr rot="0" spcFirstLastPara="0" vertOverflow="overflow" horzOverflow="overflow" vert="horz" wrap="square" lIns="91440" tIns="45720" rIns="91440" bIns="45720" numCol="1" spcCol="0" rtlCol="0" fromWordArt="0" anchor="ctr" anchorCtr="0" forceAA="0" compatLnSpc="1">
+            <a:prstTxWarp prst="textNoShape">
+              <a:avLst/>
+            </a:prstTxWarp>
+            <a:noAutofit/>
+          </a:bodyPr>
+          <a:lstStyle/>
+          <a:p>
+            <a:pPr marL="0" marR="0" lvl="0" indent="0" algn="ctr" defTabSz="914400" rtl="0" eaLnBrk="1" fontAlgn="auto" latinLnBrk="0" hangingPunct="1">
+              <a:lnSpc>
+                <a:spcPct val="100000"/>
+              </a:lnSpc>
+              <a:spcBef>
+                <a:spcPts val="0"/>
+              </a:spcBef>
+              <a:spcAft>
+                <a:spcPts val="0"/>
+              </a:spcAft>
+              <a:buClrTx/>
+              <a:buSzTx/>
+              <a:buFontTx/>
+              <a:buNone/>
+              <a:tabLst/>
+              <a:defRPr/>
+            </a:pPr>
+            <a:r>
+              <a:rPr kumimoji="0" lang="en-GB" sz="1200" b="1" i="0" u="none" strike="noStrike" kern="1200" cap="none" spc="0" normalizeH="0" baseline="0" noProof="0" dirty="0">
+                <a:ln>
+                  <a:noFill/>
+                </a:ln>
+                <a:solidFill>
+                  <a:prstClr val="black"/>
+                </a:solidFill>
+                <a:effectLst/>
+                <a:uLnTx/>
+                <a:uFillTx/>
+                <a:latin typeface="Calibri" panose="020F0502020204030204"/>
+                <a:ea typeface="+mn-ea"/>
+                <a:cs typeface="+mn-cs"/>
+              </a:rPr>
+              <a:t>S</a:t>
+            </a:r>
+            <a:r>
+              <a:rPr kumimoji="0" lang="en-GB" sz="1200" b="1" i="0" u="none" strike="noStrike" kern="1200" cap="none" spc="0" normalizeH="0" baseline="-25000" noProof="0" dirty="0">
+                <a:ln>
+                  <a:noFill/>
+                </a:ln>
+                <a:solidFill>
+                  <a:prstClr val="black"/>
+                </a:solidFill>
+                <a:effectLst/>
+                <a:uLnTx/>
+                <a:uFillTx/>
+                <a:latin typeface="Calibri" panose="020F0502020204030204"/>
+                <a:ea typeface="+mn-ea"/>
+                <a:cs typeface="+mn-cs"/>
+              </a:rPr>
+              <a:t>F</a:t>
+            </a:r>
+          </a:p>
+        </p:txBody>
+      </p:sp>
+      <p:sp>
+        <p:nvSpPr>
+          <p:cNvPr id="128" name="Ellipszis 127">
+            <a:extLst>
+              <a:ext uri="{FF2B5EF4-FFF2-40B4-BE49-F238E27FC236}">
+                <a16:creationId xmlns:a16="http://schemas.microsoft.com/office/drawing/2014/main" id="{A6AB10AA-0914-4FCF-B5CC-5E221DFD08A6}"/>
+              </a:ext>
+            </a:extLst>
+          </p:cNvPr>
+          <p:cNvSpPr/>
+          <p:nvPr/>
+        </p:nvSpPr>
+        <p:spPr>
+          <a:xfrm>
+            <a:off x="1331798" y="3715042"/>
+            <a:ext cx="467676" cy="467676"/>
+          </a:xfrm>
+          <a:prstGeom prst="ellipse">
+            <a:avLst/>
+          </a:prstGeom>
+          <a:solidFill>
+            <a:schemeClr val="bg1"/>
+          </a:solidFill>
+          <a:ln w="28575">
+            <a:solidFill>
+              <a:schemeClr val="tx1"/>
+            </a:solidFill>
+          </a:ln>
+          <a:effectLst/>
+        </p:spPr>
+        <p:style>
+          <a:lnRef idx="2">
+            <a:schemeClr val="accent4">
+              <a:shade val="50000"/>
+            </a:schemeClr>
+          </a:lnRef>
+          <a:fillRef idx="1">
+            <a:schemeClr val="accent4"/>
+          </a:fillRef>
+          <a:effectRef idx="0">
+            <a:schemeClr val="accent4"/>
+          </a:effectRef>
+          <a:fontRef idx="minor">
+            <a:schemeClr val="lt1"/>
+          </a:fontRef>
+        </p:style>
+        <p:txBody>
+          <a:bodyPr rot="0" spcFirstLastPara="0" vertOverflow="overflow" horzOverflow="overflow" vert="horz" wrap="square" lIns="91440" tIns="45720" rIns="91440" bIns="45720" numCol="1" spcCol="0" rtlCol="0" fromWordArt="0" anchor="ctr" anchorCtr="0" forceAA="0" compatLnSpc="1">
+            <a:prstTxWarp prst="textNoShape">
+              <a:avLst/>
+            </a:prstTxWarp>
+            <a:noAutofit/>
+          </a:bodyPr>
+          <a:lstStyle/>
+          <a:p>
+            <a:pPr algn="ctr"/>
+            <a:r>
+              <a:rPr lang="en-GB" sz="1200" b="1" dirty="0">
+                <a:solidFill>
+                  <a:schemeClr val="tx1"/>
+                </a:solidFill>
+              </a:rPr>
+              <a:t>S</a:t>
+            </a:r>
+            <a:r>
+              <a:rPr lang="en-GB" sz="1200" b="1" baseline="-25000" dirty="0">
+                <a:solidFill>
+                  <a:schemeClr val="tx1"/>
+                </a:solidFill>
+              </a:rPr>
+              <a:t>F</a:t>
+            </a:r>
+          </a:p>
+        </p:txBody>
+      </p:sp>
+      <p:sp>
+        <p:nvSpPr>
+          <p:cNvPr id="129" name="Ellipszis 128">
+            <a:extLst>
+              <a:ext uri="{FF2B5EF4-FFF2-40B4-BE49-F238E27FC236}">
+                <a16:creationId xmlns:a16="http://schemas.microsoft.com/office/drawing/2014/main" id="{EED5A57B-5575-46FE-85A6-87BA8358B9CA}"/>
+              </a:ext>
+            </a:extLst>
+          </p:cNvPr>
+          <p:cNvSpPr/>
+          <p:nvPr/>
+        </p:nvSpPr>
+        <p:spPr>
+          <a:xfrm>
+            <a:off x="1331798" y="5289608"/>
+            <a:ext cx="467676" cy="467676"/>
+          </a:xfrm>
+          <a:prstGeom prst="ellipse">
+            <a:avLst/>
+          </a:prstGeom>
+          <a:solidFill>
+            <a:schemeClr val="bg1"/>
+          </a:solidFill>
+          <a:ln w="28575">
+            <a:solidFill>
+              <a:schemeClr val="tx1"/>
+            </a:solidFill>
+          </a:ln>
+          <a:effectLst/>
+        </p:spPr>
+        <p:style>
+          <a:lnRef idx="2">
+            <a:schemeClr val="accent4">
+              <a:shade val="50000"/>
+            </a:schemeClr>
+          </a:lnRef>
+          <a:fillRef idx="1">
+            <a:schemeClr val="accent4"/>
+          </a:fillRef>
+          <a:effectRef idx="0">
+            <a:schemeClr val="accent4"/>
+          </a:effectRef>
+          <a:fontRef idx="minor">
+            <a:schemeClr val="lt1"/>
+          </a:fontRef>
+        </p:style>
+        <p:txBody>
+          <a:bodyPr rot="0" spcFirstLastPara="0" vertOverflow="overflow" horzOverflow="overflow" vert="horz" wrap="square" lIns="91440" tIns="45720" rIns="91440" bIns="45720" numCol="1" spcCol="0" rtlCol="0" fromWordArt="0" anchor="ctr" anchorCtr="0" forceAA="0" compatLnSpc="1">
+            <a:prstTxWarp prst="textNoShape">
+              <a:avLst/>
+            </a:prstTxWarp>
+            <a:noAutofit/>
+          </a:bodyPr>
+          <a:lstStyle/>
+          <a:p>
+            <a:pPr marL="0" marR="0" lvl="0" indent="0" algn="ctr" defTabSz="914400" rtl="0" eaLnBrk="1" fontAlgn="auto" latinLnBrk="0" hangingPunct="1">
+              <a:lnSpc>
+                <a:spcPct val="100000"/>
+              </a:lnSpc>
+              <a:spcBef>
+                <a:spcPts val="0"/>
+              </a:spcBef>
+              <a:spcAft>
+                <a:spcPts val="0"/>
+              </a:spcAft>
+              <a:buClrTx/>
+              <a:buSzTx/>
+              <a:buFontTx/>
+              <a:buNone/>
+              <a:tabLst/>
+              <a:defRPr/>
+            </a:pPr>
+            <a:r>
+              <a:rPr kumimoji="0" lang="en-GB" sz="1200" b="1" i="0" u="none" strike="noStrike" kern="1200" cap="none" spc="0" normalizeH="0" baseline="0" noProof="0" dirty="0">
+                <a:ln>
+                  <a:noFill/>
+                </a:ln>
+                <a:solidFill>
+                  <a:prstClr val="black"/>
+                </a:solidFill>
+                <a:effectLst/>
+                <a:uLnTx/>
+                <a:uFillTx/>
+                <a:latin typeface="Calibri" panose="020F0502020204030204"/>
+                <a:ea typeface="+mn-ea"/>
+                <a:cs typeface="+mn-cs"/>
+              </a:rPr>
+              <a:t>S</a:t>
+            </a:r>
+            <a:r>
+              <a:rPr kumimoji="0" lang="en-GB" sz="1200" b="1" i="0" u="none" strike="noStrike" kern="1200" cap="none" spc="0" normalizeH="0" baseline="-25000" noProof="0" dirty="0">
+                <a:ln>
+                  <a:noFill/>
+                </a:ln>
+                <a:solidFill>
+                  <a:prstClr val="black"/>
+                </a:solidFill>
+                <a:effectLst/>
+                <a:uLnTx/>
+                <a:uFillTx/>
+                <a:latin typeface="Calibri" panose="020F0502020204030204"/>
+                <a:ea typeface="+mn-ea"/>
+                <a:cs typeface="+mn-cs"/>
+              </a:rPr>
+              <a:t>F</a:t>
+            </a:r>
+          </a:p>
+        </p:txBody>
+      </p:sp>
+      <p:sp>
+        <p:nvSpPr>
+          <p:cNvPr id="130" name="Ellipszis 129">
+            <a:extLst>
+              <a:ext uri="{FF2B5EF4-FFF2-40B4-BE49-F238E27FC236}">
+                <a16:creationId xmlns:a16="http://schemas.microsoft.com/office/drawing/2014/main" id="{FC08C0D4-A0CB-4989-98CA-0C734A7CD557}"/>
+              </a:ext>
+            </a:extLst>
+          </p:cNvPr>
+          <p:cNvSpPr/>
+          <p:nvPr/>
+        </p:nvSpPr>
+        <p:spPr>
+          <a:xfrm>
+            <a:off x="5165117" y="3715042"/>
+            <a:ext cx="467676" cy="467676"/>
+          </a:xfrm>
+          <a:prstGeom prst="ellipse">
+            <a:avLst/>
+          </a:prstGeom>
+          <a:solidFill>
+            <a:schemeClr val="bg1"/>
+          </a:solidFill>
+          <a:ln w="28575">
+            <a:solidFill>
+              <a:schemeClr val="tx1"/>
+            </a:solidFill>
+          </a:ln>
+          <a:effectLst/>
+        </p:spPr>
+        <p:style>
+          <a:lnRef idx="2">
+            <a:schemeClr val="accent4">
+              <a:shade val="50000"/>
+            </a:schemeClr>
+          </a:lnRef>
+          <a:fillRef idx="1">
+            <a:schemeClr val="accent4"/>
+          </a:fillRef>
+          <a:effectRef idx="0">
+            <a:schemeClr val="accent4"/>
+          </a:effectRef>
+          <a:fontRef idx="minor">
+            <a:schemeClr val="lt1"/>
+          </a:fontRef>
+        </p:style>
+        <p:txBody>
+          <a:bodyPr rot="0" spcFirstLastPara="0" vertOverflow="overflow" horzOverflow="overflow" vert="horz" wrap="square" lIns="91440" tIns="45720" rIns="91440" bIns="45720" numCol="1" spcCol="0" rtlCol="0" fromWordArt="0" anchor="ctr" anchorCtr="0" forceAA="0" compatLnSpc="1">
+            <a:prstTxWarp prst="textNoShape">
+              <a:avLst/>
+            </a:prstTxWarp>
+            <a:noAutofit/>
+          </a:bodyPr>
+          <a:lstStyle/>
+          <a:p>
+            <a:pPr marL="0" marR="0" lvl="0" indent="0" algn="ctr" defTabSz="914400" rtl="0" eaLnBrk="1" fontAlgn="auto" latinLnBrk="0" hangingPunct="1">
+              <a:lnSpc>
+                <a:spcPct val="100000"/>
+              </a:lnSpc>
+              <a:spcBef>
+                <a:spcPts val="0"/>
+              </a:spcBef>
+              <a:spcAft>
+                <a:spcPts val="0"/>
+              </a:spcAft>
+              <a:buClrTx/>
+              <a:buSzTx/>
+              <a:buFontTx/>
+              <a:buNone/>
+              <a:tabLst/>
+              <a:defRPr/>
+            </a:pPr>
+            <a:r>
+              <a:rPr kumimoji="0" lang="en-GB" sz="1200" b="1" i="0" u="none" strike="noStrike" kern="1200" cap="none" spc="0" normalizeH="0" baseline="0" noProof="0" dirty="0">
+                <a:ln>
+                  <a:noFill/>
+                </a:ln>
+                <a:solidFill>
+                  <a:prstClr val="black"/>
+                </a:solidFill>
+                <a:effectLst/>
+                <a:uLnTx/>
+                <a:uFillTx/>
+                <a:latin typeface="Calibri" panose="020F0502020204030204"/>
+                <a:ea typeface="+mn-ea"/>
+                <a:cs typeface="+mn-cs"/>
+              </a:rPr>
+              <a:t>S</a:t>
+            </a:r>
+            <a:r>
+              <a:rPr kumimoji="0" lang="en-GB" sz="1200" b="1" i="0" u="none" strike="noStrike" kern="1200" cap="none" spc="0" normalizeH="0" baseline="-25000" noProof="0" dirty="0">
+                <a:ln>
+                  <a:noFill/>
+                </a:ln>
+                <a:solidFill>
+                  <a:prstClr val="black"/>
+                </a:solidFill>
+                <a:effectLst/>
+                <a:uLnTx/>
+                <a:uFillTx/>
+                <a:latin typeface="Calibri" panose="020F0502020204030204"/>
+                <a:ea typeface="+mn-ea"/>
+                <a:cs typeface="+mn-cs"/>
+              </a:rPr>
+              <a:t>F</a:t>
+            </a:r>
+          </a:p>
+        </p:txBody>
+      </p:sp>
+      <p:sp>
+        <p:nvSpPr>
+          <p:cNvPr id="131" name="Ellipszis 130">
+            <a:extLst>
+              <a:ext uri="{FF2B5EF4-FFF2-40B4-BE49-F238E27FC236}">
+                <a16:creationId xmlns:a16="http://schemas.microsoft.com/office/drawing/2014/main" id="{AEA15D37-CD69-4F71-9E0F-0EBF73D180FE}"/>
+              </a:ext>
+            </a:extLst>
+          </p:cNvPr>
+          <p:cNvSpPr/>
+          <p:nvPr/>
+        </p:nvSpPr>
+        <p:spPr>
+          <a:xfrm>
+            <a:off x="5210924" y="5289608"/>
+            <a:ext cx="467676" cy="467676"/>
+          </a:xfrm>
+          <a:prstGeom prst="ellipse">
+            <a:avLst/>
+          </a:prstGeom>
+          <a:solidFill>
+            <a:schemeClr val="bg1"/>
+          </a:solidFill>
+          <a:ln w="28575">
+            <a:solidFill>
+              <a:schemeClr val="tx1"/>
+            </a:solidFill>
+          </a:ln>
+          <a:effectLst/>
+        </p:spPr>
+        <p:style>
+          <a:lnRef idx="2">
+            <a:schemeClr val="accent4">
+              <a:shade val="50000"/>
+            </a:schemeClr>
+          </a:lnRef>
+          <a:fillRef idx="1">
+            <a:schemeClr val="accent4"/>
+          </a:fillRef>
+          <a:effectRef idx="0">
+            <a:schemeClr val="accent4"/>
+          </a:effectRef>
+          <a:fontRef idx="minor">
+            <a:schemeClr val="lt1"/>
+          </a:fontRef>
+        </p:style>
+        <p:txBody>
+          <a:bodyPr rot="0" spcFirstLastPara="0" vertOverflow="overflow" horzOverflow="overflow" vert="horz" wrap="square" lIns="91440" tIns="45720" rIns="91440" bIns="45720" numCol="1" spcCol="0" rtlCol="0" fromWordArt="0" anchor="ctr" anchorCtr="0" forceAA="0" compatLnSpc="1">
+            <a:prstTxWarp prst="textNoShape">
+              <a:avLst/>
+            </a:prstTxWarp>
+            <a:noAutofit/>
+          </a:bodyPr>
+          <a:lstStyle/>
+          <a:p>
+            <a:pPr marL="0" marR="0" lvl="0" indent="0" algn="ctr" defTabSz="914400" rtl="0" eaLnBrk="1" fontAlgn="auto" latinLnBrk="0" hangingPunct="1">
+              <a:lnSpc>
+                <a:spcPct val="100000"/>
+              </a:lnSpc>
+              <a:spcBef>
+                <a:spcPts val="0"/>
+              </a:spcBef>
+              <a:spcAft>
+                <a:spcPts val="0"/>
+              </a:spcAft>
+              <a:buClrTx/>
+              <a:buSzTx/>
+              <a:buFontTx/>
+              <a:buNone/>
+              <a:tabLst/>
+              <a:defRPr/>
+            </a:pPr>
+            <a:r>
+              <a:rPr kumimoji="0" lang="en-GB" sz="1200" b="1" i="0" u="none" strike="noStrike" kern="1200" cap="none" spc="0" normalizeH="0" baseline="0" noProof="0" dirty="0">
+                <a:ln>
+                  <a:noFill/>
+                </a:ln>
+                <a:solidFill>
+                  <a:prstClr val="black"/>
+                </a:solidFill>
+                <a:effectLst/>
+                <a:uLnTx/>
+                <a:uFillTx/>
+                <a:latin typeface="Calibri" panose="020F0502020204030204"/>
+                <a:ea typeface="+mn-ea"/>
+                <a:cs typeface="+mn-cs"/>
+              </a:rPr>
+              <a:t>S</a:t>
+            </a:r>
+            <a:r>
+              <a:rPr kumimoji="0" lang="en-GB" sz="1200" b="1" i="0" u="none" strike="noStrike" kern="1200" cap="none" spc="0" normalizeH="0" baseline="-25000" noProof="0" dirty="0">
+                <a:ln>
+                  <a:noFill/>
+                </a:ln>
+                <a:solidFill>
+                  <a:prstClr val="black"/>
+                </a:solidFill>
+                <a:effectLst/>
+                <a:uLnTx/>
+                <a:uFillTx/>
+                <a:latin typeface="Calibri" panose="020F0502020204030204"/>
+                <a:ea typeface="+mn-ea"/>
+                <a:cs typeface="+mn-cs"/>
+              </a:rPr>
+              <a:t>F</a:t>
+            </a:r>
+          </a:p>
+        </p:txBody>
+      </p:sp>
+      <p:sp>
+        <p:nvSpPr>
+          <p:cNvPr id="134" name="Szövegdoboz 133">
+            <a:extLst>
+              <a:ext uri="{FF2B5EF4-FFF2-40B4-BE49-F238E27FC236}">
+                <a16:creationId xmlns:a16="http://schemas.microsoft.com/office/drawing/2014/main" id="{1A726A8F-3EC8-4C01-AE78-4F06D169151E}"/>
               </a:ext>
             </a:extLst>
           </p:cNvPr>
@@ -5310,8 +5863,8 @@
         </p:nvSpPr>
         <p:spPr>
           <a:xfrm>
-            <a:off x="3966076" y="3058745"/>
-            <a:ext cx="1417376" cy="369332"/>
+            <a:off x="595976" y="6153780"/>
+            <a:ext cx="1829989" cy="369332"/>
           </a:xfrm>
           <a:prstGeom prst="rect">
             <a:avLst/>
@@ -5327,8 +5880,718 @@
             <a:pPr algn="ctr"/>
             <a:r>
               <a:rPr lang="en-GB" dirty="0"/>
+              <a:t>set of input flows</a:t>
+            </a:r>
+          </a:p>
+        </p:txBody>
+      </p:sp>
+      <p:sp>
+        <p:nvSpPr>
+          <p:cNvPr id="135" name="Szövegdoboz 134">
+            <a:extLst>
+              <a:ext uri="{FF2B5EF4-FFF2-40B4-BE49-F238E27FC236}">
+                <a16:creationId xmlns:a16="http://schemas.microsoft.com/office/drawing/2014/main" id="{2367548D-513C-4549-A10E-7B0F4BC5D808}"/>
+              </a:ext>
+            </a:extLst>
+          </p:cNvPr>
+          <p:cNvSpPr txBox="1"/>
+          <p:nvPr/>
+        </p:nvSpPr>
+        <p:spPr>
+          <a:xfrm>
+            <a:off x="4464809" y="6153780"/>
+            <a:ext cx="1955023" cy="369332"/>
+          </a:xfrm>
+          <a:prstGeom prst="rect">
+            <a:avLst/>
+          </a:prstGeom>
+          <a:noFill/>
+        </p:spPr>
+        <p:txBody>
+          <a:bodyPr wrap="none" rtlCol="0">
+            <a:spAutoFit/>
+          </a:bodyPr>
+          <a:lstStyle/>
+          <a:p>
+            <a:pPr algn="ctr"/>
+            <a:r>
+              <a:rPr lang="en-GB" dirty="0"/>
+              <a:t>set of output flows</a:t>
+            </a:r>
+          </a:p>
+        </p:txBody>
+      </p:sp>
+      <p:sp>
+        <p:nvSpPr>
+          <p:cNvPr id="136" name="Ellipszis 135">
+            <a:extLst>
+              <a:ext uri="{FF2B5EF4-FFF2-40B4-BE49-F238E27FC236}">
+                <a16:creationId xmlns:a16="http://schemas.microsoft.com/office/drawing/2014/main" id="{850EC349-406B-47B5-B401-7EE5DF127940}"/>
+              </a:ext>
+            </a:extLst>
+          </p:cNvPr>
+          <p:cNvSpPr/>
+          <p:nvPr/>
+        </p:nvSpPr>
+        <p:spPr>
+          <a:xfrm>
+            <a:off x="3232352" y="4488392"/>
+            <a:ext cx="497818" cy="497818"/>
+          </a:xfrm>
+          <a:prstGeom prst="ellipse">
+            <a:avLst/>
+          </a:prstGeom>
+          <a:solidFill>
+            <a:schemeClr val="bg1"/>
+          </a:solidFill>
+          <a:ln w="28575">
+            <a:solidFill>
+              <a:schemeClr val="tx1"/>
+            </a:solidFill>
+          </a:ln>
+          <a:effectLst/>
+        </p:spPr>
+        <p:style>
+          <a:lnRef idx="2">
+            <a:schemeClr val="accent4">
+              <a:shade val="50000"/>
+            </a:schemeClr>
+          </a:lnRef>
+          <a:fillRef idx="1">
+            <a:schemeClr val="accent4"/>
+          </a:fillRef>
+          <a:effectRef idx="0">
+            <a:schemeClr val="accent4"/>
+          </a:effectRef>
+          <a:fontRef idx="minor">
+            <a:schemeClr val="lt1"/>
+          </a:fontRef>
+        </p:style>
+        <p:txBody>
+          <a:bodyPr rot="0" spcFirstLastPara="0" vertOverflow="overflow" horzOverflow="overflow" vert="horz" wrap="square" lIns="91440" tIns="45720" rIns="91440" bIns="45720" numCol="1" spcCol="0" rtlCol="0" fromWordArt="0" anchor="ctr" anchorCtr="0" forceAA="0" compatLnSpc="1">
+            <a:prstTxWarp prst="textNoShape">
+              <a:avLst/>
+            </a:prstTxWarp>
+            <a:noAutofit/>
+          </a:bodyPr>
+          <a:lstStyle/>
+          <a:p>
+            <a:pPr marL="0" marR="0" lvl="0" indent="0" algn="ctr" defTabSz="914400" rtl="0" eaLnBrk="1" fontAlgn="auto" latinLnBrk="0" hangingPunct="1">
+              <a:lnSpc>
+                <a:spcPct val="100000"/>
+              </a:lnSpc>
+              <a:spcBef>
+                <a:spcPts val="0"/>
+              </a:spcBef>
+              <a:spcAft>
+                <a:spcPts val="0"/>
+              </a:spcAft>
+              <a:buClrTx/>
+              <a:buSzTx/>
+              <a:buFontTx/>
+              <a:buNone/>
+              <a:tabLst/>
+              <a:defRPr/>
+            </a:pPr>
+            <a:r>
+              <a:rPr kumimoji="0" lang="en-GB" sz="1200" b="1" i="0" u="none" strike="noStrike" kern="1200" cap="none" spc="0" normalizeH="0" baseline="0" noProof="0" dirty="0">
+                <a:ln>
+                  <a:noFill/>
+                </a:ln>
+                <a:solidFill>
+                  <a:prstClr val="black"/>
+                </a:solidFill>
+                <a:effectLst/>
+                <a:uLnTx/>
+                <a:uFillTx/>
+                <a:latin typeface="Calibri" panose="020F0502020204030204"/>
+                <a:ea typeface="+mn-ea"/>
+                <a:cs typeface="+mn-cs"/>
+              </a:rPr>
+              <a:t>S</a:t>
+            </a:r>
+            <a:r>
+              <a:rPr kumimoji="0" lang="en-GB" sz="1200" b="1" i="0" u="none" strike="noStrike" kern="1200" cap="none" spc="0" normalizeH="0" baseline="-25000" noProof="0" dirty="0">
+                <a:ln>
+                  <a:noFill/>
+                </a:ln>
+                <a:solidFill>
+                  <a:prstClr val="black"/>
+                </a:solidFill>
+                <a:effectLst/>
+                <a:uLnTx/>
+                <a:uFillTx/>
+                <a:latin typeface="Calibri" panose="020F0502020204030204"/>
+                <a:ea typeface="+mn-ea"/>
+                <a:cs typeface="+mn-cs"/>
+              </a:rPr>
+              <a:t>N</a:t>
+            </a:r>
+          </a:p>
+        </p:txBody>
+      </p:sp>
+      <p:sp>
+        <p:nvSpPr>
+          <p:cNvPr id="137" name="Szövegdoboz 136">
+            <a:extLst>
+              <a:ext uri="{FF2B5EF4-FFF2-40B4-BE49-F238E27FC236}">
+                <a16:creationId xmlns:a16="http://schemas.microsoft.com/office/drawing/2014/main" id="{264D5FAD-AC83-4640-8A06-A0A367C2EA49}"/>
+              </a:ext>
+            </a:extLst>
+          </p:cNvPr>
+          <p:cNvSpPr txBox="1"/>
+          <p:nvPr/>
+        </p:nvSpPr>
+        <p:spPr>
+          <a:xfrm>
+            <a:off x="2109695" y="3850161"/>
+            <a:ext cx="415499" cy="369332"/>
+          </a:xfrm>
+          <a:prstGeom prst="rect">
+            <a:avLst/>
+          </a:prstGeom>
+          <a:noFill/>
+        </p:spPr>
+        <p:txBody>
+          <a:bodyPr wrap="none" rtlCol="0">
+            <a:spAutoFit/>
+          </a:bodyPr>
+          <a:lstStyle/>
+          <a:p>
+            <a:pPr algn="ctr"/>
+            <a:r>
+              <a:rPr lang="en-GB" b="1" dirty="0" err="1"/>
+              <a:t>F</a:t>
+            </a:r>
+            <a:r>
+              <a:rPr lang="en-GB" b="1" baseline="-25000" dirty="0" err="1"/>
+              <a:t>In</a:t>
+            </a:r>
+            <a:endParaRPr lang="en-GB" b="1" baseline="-25000" dirty="0"/>
+          </a:p>
+        </p:txBody>
+      </p:sp>
+      <p:sp>
+        <p:nvSpPr>
+          <p:cNvPr id="138" name="Szövegdoboz 137">
+            <a:extLst>
+              <a:ext uri="{FF2B5EF4-FFF2-40B4-BE49-F238E27FC236}">
+                <a16:creationId xmlns:a16="http://schemas.microsoft.com/office/drawing/2014/main" id="{E055E76F-CDC8-4579-904F-A9826391235A}"/>
+              </a:ext>
+            </a:extLst>
+          </p:cNvPr>
+          <p:cNvSpPr txBox="1"/>
+          <p:nvPr/>
+        </p:nvSpPr>
+        <p:spPr>
+          <a:xfrm>
+            <a:off x="3215741" y="5104794"/>
+            <a:ext cx="543740" cy="369332"/>
+          </a:xfrm>
+          <a:prstGeom prst="rect">
+            <a:avLst/>
+          </a:prstGeom>
+          <a:noFill/>
+        </p:spPr>
+        <p:txBody>
+          <a:bodyPr wrap="none" rtlCol="0">
+            <a:spAutoFit/>
+          </a:bodyPr>
+          <a:lstStyle/>
+          <a:p>
+            <a:pPr algn="ctr"/>
+            <a:r>
+              <a:rPr lang="en-GB" b="1" dirty="0" err="1"/>
+              <a:t>F</a:t>
+            </a:r>
+            <a:r>
+              <a:rPr lang="en-GB" b="1" baseline="-25000" dirty="0" err="1"/>
+              <a:t>Run</a:t>
+            </a:r>
+            <a:endParaRPr lang="en-GB" b="1" baseline="-25000" dirty="0"/>
+          </a:p>
+        </p:txBody>
+      </p:sp>
+      <p:sp>
+        <p:nvSpPr>
+          <p:cNvPr id="139" name="Szövegdoboz 138">
+            <a:extLst>
+              <a:ext uri="{FF2B5EF4-FFF2-40B4-BE49-F238E27FC236}">
+                <a16:creationId xmlns:a16="http://schemas.microsoft.com/office/drawing/2014/main" id="{3CC5766E-6F53-4233-9914-62F2E9B74908}"/>
+              </a:ext>
+            </a:extLst>
+          </p:cNvPr>
+          <p:cNvSpPr txBox="1"/>
+          <p:nvPr/>
+        </p:nvSpPr>
+        <p:spPr>
+          <a:xfrm>
+            <a:off x="4451436" y="3850161"/>
+            <a:ext cx="529247" cy="369332"/>
+          </a:xfrm>
+          <a:prstGeom prst="rect">
+            <a:avLst/>
+          </a:prstGeom>
+          <a:noFill/>
+        </p:spPr>
+        <p:txBody>
+          <a:bodyPr wrap="none" rtlCol="0">
+            <a:spAutoFit/>
+          </a:bodyPr>
+          <a:lstStyle/>
+          <a:p>
+            <a:pPr algn="ctr"/>
+            <a:r>
+              <a:rPr lang="en-GB" b="1" dirty="0" err="1"/>
+              <a:t>F</a:t>
+            </a:r>
+            <a:r>
+              <a:rPr lang="en-GB" b="1" baseline="-25000" dirty="0" err="1"/>
+              <a:t>Out</a:t>
+            </a:r>
+            <a:endParaRPr lang="en-GB" b="1" baseline="-25000" dirty="0"/>
+          </a:p>
+        </p:txBody>
+      </p:sp>
+      <p:cxnSp>
+        <p:nvCxnSpPr>
+          <p:cNvPr id="140" name="Összekötő: görbe 139">
+            <a:extLst>
+              <a:ext uri="{FF2B5EF4-FFF2-40B4-BE49-F238E27FC236}">
+                <a16:creationId xmlns:a16="http://schemas.microsoft.com/office/drawing/2014/main" id="{C0AD5570-A927-462F-BD0D-DD5D2AFF76AE}"/>
+              </a:ext>
+            </a:extLst>
+          </p:cNvPr>
+          <p:cNvCxnSpPr>
+            <a:cxnSpLocks/>
+            <a:stCxn id="136" idx="3"/>
+            <a:endCxn id="136" idx="5"/>
+          </p:cNvCxnSpPr>
+          <p:nvPr/>
+        </p:nvCxnSpPr>
+        <p:spPr>
+          <a:xfrm rot="16200000" flipH="1">
+            <a:off x="3481261" y="4737301"/>
+            <a:ext cx="12700" cy="352010"/>
+          </a:xfrm>
+          <a:prstGeom prst="curvedConnector3">
+            <a:avLst>
+              <a:gd name="adj1" fmla="val 2074047"/>
+            </a:avLst>
+          </a:prstGeom>
+          <a:ln w="19050">
+            <a:solidFill>
+              <a:srgbClr val="C00000"/>
+            </a:solidFill>
+            <a:tailEnd type="triangle"/>
+          </a:ln>
+        </p:spPr>
+        <p:style>
+          <a:lnRef idx="1">
+            <a:schemeClr val="accent1"/>
+          </a:lnRef>
+          <a:fillRef idx="0">
+            <a:schemeClr val="accent1"/>
+          </a:fillRef>
+          <a:effectRef idx="0">
+            <a:schemeClr val="accent1"/>
+          </a:effectRef>
+          <a:fontRef idx="minor">
+            <a:schemeClr val="tx1"/>
+          </a:fontRef>
+        </p:style>
+      </p:cxnSp>
+      <p:sp>
+        <p:nvSpPr>
+          <p:cNvPr id="141" name="Szövegdoboz 140">
+            <a:extLst>
+              <a:ext uri="{FF2B5EF4-FFF2-40B4-BE49-F238E27FC236}">
+                <a16:creationId xmlns:a16="http://schemas.microsoft.com/office/drawing/2014/main" id="{64C1F674-E88E-4379-BF82-45CC8FA3995C}"/>
+              </a:ext>
+            </a:extLst>
+          </p:cNvPr>
+          <p:cNvSpPr txBox="1"/>
+          <p:nvPr/>
+        </p:nvSpPr>
+        <p:spPr>
+          <a:xfrm>
+            <a:off x="2794376" y="6173451"/>
+            <a:ext cx="1417376" cy="369332"/>
+          </a:xfrm>
+          <a:prstGeom prst="rect">
+            <a:avLst/>
+          </a:prstGeom>
+          <a:noFill/>
+        </p:spPr>
+        <p:txBody>
+          <a:bodyPr wrap="none" rtlCol="0">
+            <a:spAutoFit/>
+          </a:bodyPr>
+          <a:lstStyle/>
+          <a:p>
+            <a:pPr algn="ctr"/>
+            <a:r>
+              <a:rPr lang="en-GB" dirty="0"/>
               <a:t>activity node</a:t>
             </a:r>
+          </a:p>
+        </p:txBody>
+      </p:sp>
+      <p:cxnSp>
+        <p:nvCxnSpPr>
+          <p:cNvPr id="142" name="Egyenes összekötő nyíllal 141">
+            <a:extLst>
+              <a:ext uri="{FF2B5EF4-FFF2-40B4-BE49-F238E27FC236}">
+                <a16:creationId xmlns:a16="http://schemas.microsoft.com/office/drawing/2014/main" id="{66D8E759-BEA9-4379-85F2-447233036EB1}"/>
+              </a:ext>
+            </a:extLst>
+          </p:cNvPr>
+          <p:cNvCxnSpPr>
+            <a:cxnSpLocks/>
+            <a:stCxn id="126" idx="6"/>
+            <a:endCxn id="136" idx="2"/>
+          </p:cNvCxnSpPr>
+          <p:nvPr/>
+        </p:nvCxnSpPr>
+        <p:spPr>
+          <a:xfrm>
+            <a:off x="1619578" y="4737301"/>
+            <a:ext cx="1612774" cy="0"/>
+          </a:xfrm>
+          <a:prstGeom prst="straightConnector1">
+            <a:avLst/>
+          </a:prstGeom>
+          <a:ln w="19050">
+            <a:solidFill>
+              <a:srgbClr val="C00000"/>
+            </a:solidFill>
+            <a:tailEnd type="triangle"/>
+          </a:ln>
+        </p:spPr>
+        <p:style>
+          <a:lnRef idx="1">
+            <a:schemeClr val="accent1"/>
+          </a:lnRef>
+          <a:fillRef idx="0">
+            <a:schemeClr val="accent1"/>
+          </a:fillRef>
+          <a:effectRef idx="0">
+            <a:schemeClr val="accent1"/>
+          </a:effectRef>
+          <a:fontRef idx="minor">
+            <a:schemeClr val="tx1"/>
+          </a:fontRef>
+        </p:style>
+      </p:cxnSp>
+      <p:cxnSp>
+        <p:nvCxnSpPr>
+          <p:cNvPr id="143" name="Egyenes összekötő nyíllal 142">
+            <a:extLst>
+              <a:ext uri="{FF2B5EF4-FFF2-40B4-BE49-F238E27FC236}">
+                <a16:creationId xmlns:a16="http://schemas.microsoft.com/office/drawing/2014/main" id="{1FCFB936-1B36-4D78-B947-1F38EEA5DF05}"/>
+              </a:ext>
+            </a:extLst>
+          </p:cNvPr>
+          <p:cNvCxnSpPr>
+            <a:cxnSpLocks/>
+            <a:stCxn id="136" idx="6"/>
+            <a:endCxn id="127" idx="2"/>
+          </p:cNvCxnSpPr>
+          <p:nvPr/>
+        </p:nvCxnSpPr>
+        <p:spPr>
+          <a:xfrm flipV="1">
+            <a:off x="3730170" y="4721088"/>
+            <a:ext cx="1633507" cy="16213"/>
+          </a:xfrm>
+          <a:prstGeom prst="straightConnector1">
+            <a:avLst/>
+          </a:prstGeom>
+          <a:ln w="19050">
+            <a:solidFill>
+              <a:srgbClr val="C00000"/>
+            </a:solidFill>
+            <a:tailEnd type="triangle"/>
+          </a:ln>
+        </p:spPr>
+        <p:style>
+          <a:lnRef idx="1">
+            <a:schemeClr val="accent1"/>
+          </a:lnRef>
+          <a:fillRef idx="0">
+            <a:schemeClr val="accent1"/>
+          </a:fillRef>
+          <a:effectRef idx="0">
+            <a:schemeClr val="accent1"/>
+          </a:effectRef>
+          <a:fontRef idx="minor">
+            <a:schemeClr val="tx1"/>
+          </a:fontRef>
+        </p:style>
+      </p:cxnSp>
+      <p:cxnSp>
+        <p:nvCxnSpPr>
+          <p:cNvPr id="146" name="Egyenes összekötő nyíllal 145">
+            <a:extLst>
+              <a:ext uri="{FF2B5EF4-FFF2-40B4-BE49-F238E27FC236}">
+                <a16:creationId xmlns:a16="http://schemas.microsoft.com/office/drawing/2014/main" id="{C41BC339-45DD-4FE6-8E11-6F0B9953EC83}"/>
+              </a:ext>
+            </a:extLst>
+          </p:cNvPr>
+          <p:cNvCxnSpPr>
+            <a:cxnSpLocks/>
+            <a:stCxn id="128" idx="5"/>
+            <a:endCxn id="136" idx="2"/>
+          </p:cNvCxnSpPr>
+          <p:nvPr/>
+        </p:nvCxnSpPr>
+        <p:spPr>
+          <a:xfrm>
+            <a:off x="1730984" y="4114228"/>
+            <a:ext cx="1501368" cy="623073"/>
+          </a:xfrm>
+          <a:prstGeom prst="straightConnector1">
+            <a:avLst/>
+          </a:prstGeom>
+          <a:ln w="19050">
+            <a:solidFill>
+              <a:srgbClr val="C00000"/>
+            </a:solidFill>
+            <a:tailEnd type="triangle"/>
+          </a:ln>
+        </p:spPr>
+        <p:style>
+          <a:lnRef idx="1">
+            <a:schemeClr val="accent1"/>
+          </a:lnRef>
+          <a:fillRef idx="0">
+            <a:schemeClr val="accent1"/>
+          </a:fillRef>
+          <a:effectRef idx="0">
+            <a:schemeClr val="accent1"/>
+          </a:effectRef>
+          <a:fontRef idx="minor">
+            <a:schemeClr val="tx1"/>
+          </a:fontRef>
+        </p:style>
+      </p:cxnSp>
+      <p:cxnSp>
+        <p:nvCxnSpPr>
+          <p:cNvPr id="147" name="Egyenes összekötő nyíllal 146">
+            <a:extLst>
+              <a:ext uri="{FF2B5EF4-FFF2-40B4-BE49-F238E27FC236}">
+                <a16:creationId xmlns:a16="http://schemas.microsoft.com/office/drawing/2014/main" id="{A0C2609A-97EE-4B00-B7DC-81CB906AD248}"/>
+              </a:ext>
+            </a:extLst>
+          </p:cNvPr>
+          <p:cNvCxnSpPr>
+            <a:cxnSpLocks/>
+            <a:stCxn id="129" idx="7"/>
+            <a:endCxn id="136" idx="2"/>
+          </p:cNvCxnSpPr>
+          <p:nvPr/>
+        </p:nvCxnSpPr>
+        <p:spPr>
+          <a:xfrm flipV="1">
+            <a:off x="1730984" y="4737301"/>
+            <a:ext cx="1501368" cy="620797"/>
+          </a:xfrm>
+          <a:prstGeom prst="straightConnector1">
+            <a:avLst/>
+          </a:prstGeom>
+          <a:ln w="19050">
+            <a:solidFill>
+              <a:srgbClr val="C00000"/>
+            </a:solidFill>
+            <a:tailEnd type="triangle"/>
+          </a:ln>
+        </p:spPr>
+        <p:style>
+          <a:lnRef idx="1">
+            <a:schemeClr val="accent1"/>
+          </a:lnRef>
+          <a:fillRef idx="0">
+            <a:schemeClr val="accent1"/>
+          </a:fillRef>
+          <a:effectRef idx="0">
+            <a:schemeClr val="accent1"/>
+          </a:effectRef>
+          <a:fontRef idx="minor">
+            <a:schemeClr val="tx1"/>
+          </a:fontRef>
+        </p:style>
+      </p:cxnSp>
+      <p:cxnSp>
+        <p:nvCxnSpPr>
+          <p:cNvPr id="152" name="Egyenes összekötő nyíllal 151">
+            <a:extLst>
+              <a:ext uri="{FF2B5EF4-FFF2-40B4-BE49-F238E27FC236}">
+                <a16:creationId xmlns:a16="http://schemas.microsoft.com/office/drawing/2014/main" id="{84BE79EE-5442-477E-B6A9-AECCCFB5370E}"/>
+              </a:ext>
+            </a:extLst>
+          </p:cNvPr>
+          <p:cNvCxnSpPr>
+            <a:cxnSpLocks/>
+            <a:stCxn id="136" idx="6"/>
+            <a:endCxn id="130" idx="3"/>
+          </p:cNvCxnSpPr>
+          <p:nvPr/>
+        </p:nvCxnSpPr>
+        <p:spPr>
+          <a:xfrm flipV="1">
+            <a:off x="3730170" y="4114228"/>
+            <a:ext cx="1503437" cy="623073"/>
+          </a:xfrm>
+          <a:prstGeom prst="straightConnector1">
+            <a:avLst/>
+          </a:prstGeom>
+          <a:ln w="19050">
+            <a:solidFill>
+              <a:srgbClr val="C00000"/>
+            </a:solidFill>
+            <a:tailEnd type="triangle"/>
+          </a:ln>
+        </p:spPr>
+        <p:style>
+          <a:lnRef idx="1">
+            <a:schemeClr val="accent1"/>
+          </a:lnRef>
+          <a:fillRef idx="0">
+            <a:schemeClr val="accent1"/>
+          </a:fillRef>
+          <a:effectRef idx="0">
+            <a:schemeClr val="accent1"/>
+          </a:effectRef>
+          <a:fontRef idx="minor">
+            <a:schemeClr val="tx1"/>
+          </a:fontRef>
+        </p:style>
+      </p:cxnSp>
+      <p:cxnSp>
+        <p:nvCxnSpPr>
+          <p:cNvPr id="157" name="Egyenes összekötő nyíllal 156">
+            <a:extLst>
+              <a:ext uri="{FF2B5EF4-FFF2-40B4-BE49-F238E27FC236}">
+                <a16:creationId xmlns:a16="http://schemas.microsoft.com/office/drawing/2014/main" id="{0004AEA6-0504-4ED7-986A-D47ACAF08C6E}"/>
+              </a:ext>
+            </a:extLst>
+          </p:cNvPr>
+          <p:cNvCxnSpPr>
+            <a:cxnSpLocks/>
+            <a:stCxn id="136" idx="6"/>
+            <a:endCxn id="131" idx="1"/>
+          </p:cNvCxnSpPr>
+          <p:nvPr/>
+        </p:nvCxnSpPr>
+        <p:spPr>
+          <a:xfrm>
+            <a:off x="3730170" y="4737301"/>
+            <a:ext cx="1549244" cy="620797"/>
+          </a:xfrm>
+          <a:prstGeom prst="straightConnector1">
+            <a:avLst/>
+          </a:prstGeom>
+          <a:ln w="19050">
+            <a:solidFill>
+              <a:srgbClr val="C00000"/>
+            </a:solidFill>
+            <a:tailEnd type="triangle"/>
+          </a:ln>
+        </p:spPr>
+        <p:style>
+          <a:lnRef idx="1">
+            <a:schemeClr val="accent1"/>
+          </a:lnRef>
+          <a:fillRef idx="0">
+            <a:schemeClr val="accent1"/>
+          </a:fillRef>
+          <a:effectRef idx="0">
+            <a:schemeClr val="accent1"/>
+          </a:effectRef>
+          <a:fontRef idx="minor">
+            <a:schemeClr val="tx1"/>
+          </a:fontRef>
+        </p:style>
+      </p:cxnSp>
+      <p:sp>
+        <p:nvSpPr>
+          <p:cNvPr id="160" name="Szövegdoboz 159">
+            <a:extLst>
+              <a:ext uri="{FF2B5EF4-FFF2-40B4-BE49-F238E27FC236}">
+                <a16:creationId xmlns:a16="http://schemas.microsoft.com/office/drawing/2014/main" id="{A836C5F3-4829-4233-98C0-A7CD3CEE0156}"/>
+              </a:ext>
+            </a:extLst>
+          </p:cNvPr>
+          <p:cNvSpPr txBox="1"/>
+          <p:nvPr/>
+        </p:nvSpPr>
+        <p:spPr>
+          <a:xfrm>
+            <a:off x="4451437" y="5104585"/>
+            <a:ext cx="529247" cy="369332"/>
+          </a:xfrm>
+          <a:prstGeom prst="rect">
+            <a:avLst/>
+          </a:prstGeom>
+          <a:noFill/>
+        </p:spPr>
+        <p:txBody>
+          <a:bodyPr wrap="none" rtlCol="0">
+            <a:spAutoFit/>
+          </a:bodyPr>
+          <a:lstStyle/>
+          <a:p>
+            <a:pPr algn="ctr"/>
+            <a:r>
+              <a:rPr lang="en-GB" b="1" dirty="0" err="1"/>
+              <a:t>F</a:t>
+            </a:r>
+            <a:r>
+              <a:rPr lang="en-GB" b="1" baseline="-25000" dirty="0" err="1"/>
+              <a:t>Out</a:t>
+            </a:r>
+            <a:endParaRPr lang="en-GB" b="1" baseline="-25000" dirty="0"/>
+          </a:p>
+        </p:txBody>
+      </p:sp>
+      <p:sp>
+        <p:nvSpPr>
+          <p:cNvPr id="162" name="Szövegdoboz 161">
+            <a:extLst>
+              <a:ext uri="{FF2B5EF4-FFF2-40B4-BE49-F238E27FC236}">
+                <a16:creationId xmlns:a16="http://schemas.microsoft.com/office/drawing/2014/main" id="{31479469-2FEE-48E3-8FB3-3120EA993486}"/>
+              </a:ext>
+            </a:extLst>
+          </p:cNvPr>
+          <p:cNvSpPr txBox="1"/>
+          <p:nvPr/>
+        </p:nvSpPr>
+        <p:spPr>
+          <a:xfrm>
+            <a:off x="2109696" y="5104585"/>
+            <a:ext cx="415499" cy="369332"/>
+          </a:xfrm>
+          <a:prstGeom prst="rect">
+            <a:avLst/>
+          </a:prstGeom>
+          <a:noFill/>
+        </p:spPr>
+        <p:txBody>
+          <a:bodyPr wrap="none" rtlCol="0">
+            <a:spAutoFit/>
+          </a:bodyPr>
+          <a:lstStyle/>
+          <a:p>
+            <a:pPr algn="ctr"/>
+            <a:r>
+              <a:rPr lang="en-GB" b="1" dirty="0" err="1"/>
+              <a:t>F</a:t>
+            </a:r>
+            <a:r>
+              <a:rPr lang="en-GB" b="1" baseline="-25000" dirty="0" err="1"/>
+              <a:t>In</a:t>
+            </a:r>
+            <a:endParaRPr lang="en-GB" b="1" baseline="-25000" dirty="0"/>
           </a:p>
         </p:txBody>
       </p:sp>
@@ -8454,65 +9717,162 @@
               </a:rPr>
               <a:t>Proof</a:t>
             </a:r>
-          </a:p>
-        </p:txBody>
-      </p:sp>
-      <p:sp>
-        <p:nvSpPr>
-          <p:cNvPr id="10" name="Ellipszis 9">
-            <a:extLst>
-              <a:ext uri="{FF2B5EF4-FFF2-40B4-BE49-F238E27FC236}">
-                <a16:creationId xmlns:a16="http://schemas.microsoft.com/office/drawing/2014/main" id="{8D083CE8-757B-4746-B396-058426FACBB5}"/>
-              </a:ext>
-            </a:extLst>
-          </p:cNvPr>
-          <p:cNvSpPr/>
-          <p:nvPr/>
-        </p:nvSpPr>
-        <p:spPr>
-          <a:xfrm>
-            <a:off x="6484256" y="4252689"/>
-            <a:ext cx="1130950" cy="1130950"/>
-          </a:xfrm>
-          <a:prstGeom prst="ellipse">
-            <a:avLst/>
-          </a:prstGeom>
-          <a:noFill/>
-          <a:ln w="38100">
-            <a:solidFill>
-              <a:schemeClr val="tx1"/>
-            </a:solidFill>
-          </a:ln>
-        </p:spPr>
-        <p:style>
-          <a:lnRef idx="2">
-            <a:schemeClr val="accent1">
-              <a:shade val="50000"/>
-            </a:schemeClr>
-          </a:lnRef>
-          <a:fillRef idx="1">
-            <a:schemeClr val="accent1"/>
-          </a:fillRef>
-          <a:effectRef idx="0">
-            <a:schemeClr val="accent1"/>
-          </a:effectRef>
-          <a:fontRef idx="minor">
-            <a:schemeClr val="lt1"/>
-          </a:fontRef>
-        </p:style>
-        <p:txBody>
-          <a:bodyPr rtlCol="0" anchor="ctr"/>
-          <a:lstStyle/>
-          <a:p>
-            <a:pPr algn="ctr"/>
-            <a:endParaRPr lang="en-GB" sz="2000" b="1" dirty="0">
-              <a:solidFill>
-                <a:schemeClr val="tx1"/>
-              </a:solidFill>
-            </a:endParaRPr>
-          </a:p>
-        </p:txBody>
-      </p:sp>
+            <a:r>
+              <a:rPr lang="en-GB" sz="2000" dirty="0">
+                <a:solidFill>
+                  <a:schemeClr val="tx1"/>
+                </a:solidFill>
+              </a:rPr>
+              <a:t> Trace</a:t>
+            </a:r>
+          </a:p>
+        </p:txBody>
+      </p:sp>
+      <mc:AlternateContent xmlns:mc="http://schemas.openxmlformats.org/markup-compatibility/2006">
+        <mc:Choice xmlns:a14="http://schemas.microsoft.com/office/drawing/2010/main" Requires="a14">
+          <p:sp>
+            <p:nvSpPr>
+              <p:cNvPr id="10" name="Ellipszis 9">
+                <a:extLst>
+                  <a:ext uri="{FF2B5EF4-FFF2-40B4-BE49-F238E27FC236}">
+                    <a16:creationId xmlns:a16="http://schemas.microsoft.com/office/drawing/2014/main" id="{8D083CE8-757B-4746-B396-058426FACBB5}"/>
+                  </a:ext>
+                </a:extLst>
+              </p:cNvPr>
+              <p:cNvSpPr/>
+              <p:nvPr/>
+            </p:nvSpPr>
+            <p:spPr>
+              <a:xfrm>
+                <a:off x="6484256" y="4252689"/>
+                <a:ext cx="1130950" cy="1130950"/>
+              </a:xfrm>
+              <a:prstGeom prst="ellipse">
+                <a:avLst/>
+              </a:prstGeom>
+              <a:noFill/>
+              <a:ln w="38100">
+                <a:solidFill>
+                  <a:schemeClr val="tx1"/>
+                </a:solidFill>
+              </a:ln>
+            </p:spPr>
+            <p:style>
+              <a:lnRef idx="2">
+                <a:schemeClr val="accent1">
+                  <a:shade val="50000"/>
+                </a:schemeClr>
+              </a:lnRef>
+              <a:fillRef idx="1">
+                <a:schemeClr val="accent1"/>
+              </a:fillRef>
+              <a:effectRef idx="0">
+                <a:schemeClr val="accent1"/>
+              </a:effectRef>
+              <a:fontRef idx="minor">
+                <a:schemeClr val="lt1"/>
+              </a:fontRef>
+            </p:style>
+            <p:txBody>
+              <a:bodyPr rtlCol="0" anchor="ctr"/>
+              <a:lstStyle/>
+              <a:p>
+                <a:pPr algn="ctr"/>
+                <a14:m>
+                  <m:oMathPara xmlns:m="http://schemas.openxmlformats.org/officeDocument/2006/math">
+                    <m:oMathParaPr>
+                      <m:jc m:val="centerGroup"/>
+                    </m:oMathParaPr>
+                    <m:oMath xmlns:m="http://schemas.openxmlformats.org/officeDocument/2006/math">
+                      <m:r>
+                        <a:rPr lang="en-GB" sz="1600" b="1" i="0" smtClean="0">
+                          <a:solidFill>
+                            <a:schemeClr val="tx1"/>
+                          </a:solidFill>
+                          <a:latin typeface="Cambria Math" panose="02040503050406030204" pitchFamily="18" charset="0"/>
+                        </a:rPr>
+                        <m:t>𝐌</m:t>
+                      </m:r>
+                      <m:r>
+                        <a:rPr lang="en-GB" sz="1600" b="1" i="0" dirty="0" smtClean="0">
+                          <a:solidFill>
+                            <a:schemeClr val="tx1"/>
+                          </a:solidFill>
+                          <a:latin typeface="Cambria Math" panose="02040503050406030204" pitchFamily="18" charset="0"/>
+                        </a:rPr>
+                        <m:t>⊭</m:t>
+                      </m:r>
+                      <m:r>
+                        <a:rPr lang="en-GB" sz="1600" b="1" i="0" dirty="0" smtClean="0">
+                          <a:solidFill>
+                            <a:schemeClr val="tx1"/>
+                          </a:solidFill>
+                          <a:latin typeface="Cambria Math" panose="02040503050406030204" pitchFamily="18" charset="0"/>
+                        </a:rPr>
+                        <m:t>𝛄</m:t>
+                      </m:r>
+                    </m:oMath>
+                  </m:oMathPara>
+                </a14:m>
+                <a:endParaRPr lang="en-GB" sz="1600" b="1" dirty="0">
+                  <a:solidFill>
+                    <a:schemeClr val="tx1"/>
+                  </a:solidFill>
+                </a:endParaRPr>
+              </a:p>
+            </p:txBody>
+          </p:sp>
+        </mc:Choice>
+        <mc:Fallback>
+          <p:sp>
+            <p:nvSpPr>
+              <p:cNvPr id="10" name="Ellipszis 9">
+                <a:extLst>
+                  <a:ext uri="{FF2B5EF4-FFF2-40B4-BE49-F238E27FC236}">
+                    <a16:creationId xmlns:a16="http://schemas.microsoft.com/office/drawing/2014/main" id="{8D083CE8-757B-4746-B396-058426FACBB5}"/>
+                  </a:ext>
+                </a:extLst>
+              </p:cNvPr>
+              <p:cNvSpPr>
+                <a:spLocks noRot="1" noChangeAspect="1" noMove="1" noResize="1" noEditPoints="1" noAdjustHandles="1" noChangeArrowheads="1" noChangeShapeType="1" noTextEdit="1"/>
+              </p:cNvSpPr>
+              <p:nvPr/>
+            </p:nvSpPr>
+            <p:spPr>
+              <a:xfrm>
+                <a:off x="6484256" y="4252689"/>
+                <a:ext cx="1130950" cy="1130950"/>
+              </a:xfrm>
+              <a:prstGeom prst="ellipse">
+                <a:avLst/>
+              </a:prstGeom>
+              <a:blipFill>
+                <a:blip r:embed="rId2"/>
+                <a:stretch>
+                  <a:fillRect/>
+                </a:stretch>
+              </a:blipFill>
+              <a:ln w="38100">
+                <a:solidFill>
+                  <a:schemeClr val="tx1"/>
+                </a:solidFill>
+              </a:ln>
+            </p:spPr>
+            <p:txBody>
+              <a:bodyPr/>
+              <a:lstStyle/>
+              <a:p>
+                <a:r>
+                  <a:rPr lang="en-GB">
+                    <a:noFill/>
+                  </a:rPr>
+                  <a:t> </a:t>
+                </a:r>
+              </a:p>
+            </p:txBody>
+          </p:sp>
+        </mc:Fallback>
+      </mc:AlternateContent>
       <p:cxnSp>
         <p:nvCxnSpPr>
           <p:cNvPr id="12" name="Összekötő: szögletes 11">
@@ -8812,7 +10172,7 @@
                 <a:avLst/>
               </a:prstGeom>
               <a:blipFill>
-                <a:blip r:embed="rId2"/>
+                <a:blip r:embed="rId3"/>
                 <a:stretch>
                   <a:fillRect b="-3279"/>
                 </a:stretch>
@@ -8920,7 +10280,7 @@
                 <a:avLst/>
               </a:prstGeom>
               <a:blipFill>
-                <a:blip r:embed="rId3"/>
+                <a:blip r:embed="rId4"/>
                 <a:stretch>
                   <a:fillRect b="-3279"/>
                 </a:stretch>

</xml_diff>